<commit_message>
Aktualisiert um eine weitere Information zur Größe
</commit_message>
<xml_diff>
--- a/5Power_BI/71PowerPointHilft.pptx
+++ b/5Power_BI/71PowerPointHilft.pptx
@@ -2,18 +2,18 @@
 <file path=ppt/presentation.xml><?xml version="1.0" encoding="utf-8"?>
 <p:presentation xmlns:a="http://schemas.openxmlformats.org/drawingml/2006/main" xmlns:r="http://schemas.openxmlformats.org/officeDocument/2006/relationships" xmlns:p="http://schemas.openxmlformats.org/presentationml/2006/main" saveSubsetFonts="1">
   <p:sldMasterIdLst>
-    <p:sldMasterId id="2147483648" r:id="rId1"/>
+    <p:sldMasterId id="2147483660" r:id="rId1"/>
   </p:sldMasterIdLst>
   <p:sldIdLst>
     <p:sldId id="256" r:id="rId2"/>
   </p:sldIdLst>
-  <p:sldSz cx="12192000" cy="6858000"/>
+  <p:sldSz cx="9144000" cy="5143500" type="screen16x9"/>
   <p:notesSz cx="6858000" cy="9144000"/>
   <p:defaultTextStyle>
     <a:defPPr>
-      <a:defRPr lang="de-DE"/>
+      <a:defRPr lang="en-US"/>
     </a:defPPr>
-    <a:lvl1pPr marL="0" algn="l" defTabSz="914400" rtl="0" eaLnBrk="1" latinLnBrk="0" hangingPunct="1">
+    <a:lvl1pPr marL="0" algn="l" defTabSz="457200" rtl="0" eaLnBrk="1" latinLnBrk="0" hangingPunct="1">
       <a:defRPr sz="1800" kern="1200">
         <a:solidFill>
           <a:schemeClr val="tx1"/>
@@ -23,7 +23,7 @@
         <a:cs typeface="+mn-cs"/>
       </a:defRPr>
     </a:lvl1pPr>
-    <a:lvl2pPr marL="457200" algn="l" defTabSz="914400" rtl="0" eaLnBrk="1" latinLnBrk="0" hangingPunct="1">
+    <a:lvl2pPr marL="457200" algn="l" defTabSz="457200" rtl="0" eaLnBrk="1" latinLnBrk="0" hangingPunct="1">
       <a:defRPr sz="1800" kern="1200">
         <a:solidFill>
           <a:schemeClr val="tx1"/>
@@ -33,7 +33,7 @@
         <a:cs typeface="+mn-cs"/>
       </a:defRPr>
     </a:lvl2pPr>
-    <a:lvl3pPr marL="914400" algn="l" defTabSz="914400" rtl="0" eaLnBrk="1" latinLnBrk="0" hangingPunct="1">
+    <a:lvl3pPr marL="914400" algn="l" defTabSz="457200" rtl="0" eaLnBrk="1" latinLnBrk="0" hangingPunct="1">
       <a:defRPr sz="1800" kern="1200">
         <a:solidFill>
           <a:schemeClr val="tx1"/>
@@ -43,7 +43,7 @@
         <a:cs typeface="+mn-cs"/>
       </a:defRPr>
     </a:lvl3pPr>
-    <a:lvl4pPr marL="1371600" algn="l" defTabSz="914400" rtl="0" eaLnBrk="1" latinLnBrk="0" hangingPunct="1">
+    <a:lvl4pPr marL="1371600" algn="l" defTabSz="457200" rtl="0" eaLnBrk="1" latinLnBrk="0" hangingPunct="1">
       <a:defRPr sz="1800" kern="1200">
         <a:solidFill>
           <a:schemeClr val="tx1"/>
@@ -53,7 +53,7 @@
         <a:cs typeface="+mn-cs"/>
       </a:defRPr>
     </a:lvl4pPr>
-    <a:lvl5pPr marL="1828800" algn="l" defTabSz="914400" rtl="0" eaLnBrk="1" latinLnBrk="0" hangingPunct="1">
+    <a:lvl5pPr marL="1828800" algn="l" defTabSz="457200" rtl="0" eaLnBrk="1" latinLnBrk="0" hangingPunct="1">
       <a:defRPr sz="1800" kern="1200">
         <a:solidFill>
           <a:schemeClr val="tx1"/>
@@ -63,7 +63,7 @@
         <a:cs typeface="+mn-cs"/>
       </a:defRPr>
     </a:lvl5pPr>
-    <a:lvl6pPr marL="2286000" algn="l" defTabSz="914400" rtl="0" eaLnBrk="1" latinLnBrk="0" hangingPunct="1">
+    <a:lvl6pPr marL="2286000" algn="l" defTabSz="457200" rtl="0" eaLnBrk="1" latinLnBrk="0" hangingPunct="1">
       <a:defRPr sz="1800" kern="1200">
         <a:solidFill>
           <a:schemeClr val="tx1"/>
@@ -73,7 +73,7 @@
         <a:cs typeface="+mn-cs"/>
       </a:defRPr>
     </a:lvl6pPr>
-    <a:lvl7pPr marL="2743200" algn="l" defTabSz="914400" rtl="0" eaLnBrk="1" latinLnBrk="0" hangingPunct="1">
+    <a:lvl7pPr marL="2743200" algn="l" defTabSz="457200" rtl="0" eaLnBrk="1" latinLnBrk="0" hangingPunct="1">
       <a:defRPr sz="1800" kern="1200">
         <a:solidFill>
           <a:schemeClr val="tx1"/>
@@ -83,7 +83,7 @@
         <a:cs typeface="+mn-cs"/>
       </a:defRPr>
     </a:lvl7pPr>
-    <a:lvl8pPr marL="3200400" algn="l" defTabSz="914400" rtl="0" eaLnBrk="1" latinLnBrk="0" hangingPunct="1">
+    <a:lvl8pPr marL="3200400" algn="l" defTabSz="457200" rtl="0" eaLnBrk="1" latinLnBrk="0" hangingPunct="1">
       <a:defRPr sz="1800" kern="1200">
         <a:solidFill>
           <a:schemeClr val="tx1"/>
@@ -93,7 +93,7 @@
         <a:cs typeface="+mn-cs"/>
       </a:defRPr>
     </a:lvl8pPr>
-    <a:lvl9pPr marL="3657600" algn="l" defTabSz="914400" rtl="0" eaLnBrk="1" latinLnBrk="0" hangingPunct="1">
+    <a:lvl9pPr marL="3657600" algn="l" defTabSz="457200" rtl="0" eaLnBrk="1" latinLnBrk="0" hangingPunct="1">
       <a:defRPr sz="1800" kern="1200">
         <a:solidFill>
           <a:schemeClr val="tx1"/>
@@ -104,6 +104,11 @@
       </a:defRPr>
     </a:lvl9pPr>
   </p:defaultTextStyle>
+  <p:extLst>
+    <p:ext uri="{EFAFB233-063F-42B5-8137-9DF3F51BA10A}">
+      <p15:sldGuideLst xmlns:p15="http://schemas.microsoft.com/office/powerpoint/2012/main"/>
+    </p:ext>
+  </p:extLst>
 </p:presentation>
 </file>
 
@@ -126,13 +131,7 @@
       </p:grpSpPr>
       <p:sp>
         <p:nvSpPr>
-          <p:cNvPr id="2" name="Titel 1">
-            <a:extLst>
-              <a:ext uri="{FF2B5EF4-FFF2-40B4-BE49-F238E27FC236}">
-                <a16:creationId xmlns:a16="http://schemas.microsoft.com/office/drawing/2014/main" id="{F3EA41F3-B484-97FC-3ECE-54F6F1E06634}"/>
-              </a:ext>
-            </a:extLst>
-          </p:cNvPr>
+          <p:cNvPr id="2" name="Title 1"/>
           <p:cNvSpPr>
             <a:spLocks noGrp="1"/>
           </p:cNvSpPr>
@@ -142,15 +141,15 @@
         </p:nvSpPr>
         <p:spPr>
           <a:xfrm>
-            <a:off x="1524000" y="1122363"/>
-            <a:ext cx="9144000" cy="2387600"/>
+            <a:off x="1143000" y="841772"/>
+            <a:ext cx="6858000" cy="1790700"/>
           </a:xfrm>
         </p:spPr>
         <p:txBody>
           <a:bodyPr anchor="b"/>
           <a:lstStyle>
             <a:lvl1pPr algn="ctr">
-              <a:defRPr sz="6000"/>
+              <a:defRPr sz="4500"/>
             </a:lvl1pPr>
           </a:lstStyle>
           <a:p>
@@ -158,18 +157,13 @@
               <a:rPr lang="de-DE"/>
               <a:t>Mastertitelformat bearbeiten</a:t>
             </a:r>
-          </a:p>
-        </p:txBody>
-      </p:sp>
-      <p:sp>
-        <p:nvSpPr>
-          <p:cNvPr id="3" name="Untertitel 2">
-            <a:extLst>
-              <a:ext uri="{FF2B5EF4-FFF2-40B4-BE49-F238E27FC236}">
-                <a16:creationId xmlns:a16="http://schemas.microsoft.com/office/drawing/2014/main" id="{F8C6A1AF-0FFB-A2BD-6542-648A5D850E35}"/>
-              </a:ext>
-            </a:extLst>
-          </p:cNvPr>
+            <a:endParaRPr lang="en-US" dirty="0"/>
+          </a:p>
+        </p:txBody>
+      </p:sp>
+      <p:sp>
+        <p:nvSpPr>
+          <p:cNvPr id="3" name="Subtitle 2"/>
           <p:cNvSpPr>
             <a:spLocks noGrp="1"/>
           </p:cNvSpPr>
@@ -179,8 +173,8 @@
         </p:nvSpPr>
         <p:spPr>
           <a:xfrm>
-            <a:off x="1524000" y="3602038"/>
-            <a:ext cx="9144000" cy="1655762"/>
+            <a:off x="1143000" y="2701528"/>
+            <a:ext cx="6858000" cy="1241822"/>
           </a:xfrm>
         </p:spPr>
         <p:txBody>
@@ -188,39 +182,39 @@
           <a:lstStyle>
             <a:lvl1pPr marL="0" indent="0" algn="ctr">
               <a:buNone/>
-              <a:defRPr sz="2400"/>
+              <a:defRPr sz="1800"/>
             </a:lvl1pPr>
-            <a:lvl2pPr marL="457200" indent="0" algn="ctr">
-              <a:buNone/>
-              <a:defRPr sz="2000"/>
+            <a:lvl2pPr marL="342900" indent="0" algn="ctr">
+              <a:buNone/>
+              <a:defRPr sz="1500"/>
             </a:lvl2pPr>
-            <a:lvl3pPr marL="914400" indent="0" algn="ctr">
-              <a:buNone/>
-              <a:defRPr sz="1800"/>
+            <a:lvl3pPr marL="685800" indent="0" algn="ctr">
+              <a:buNone/>
+              <a:defRPr sz="1350"/>
             </a:lvl3pPr>
-            <a:lvl4pPr marL="1371600" indent="0" algn="ctr">
-              <a:buNone/>
-              <a:defRPr sz="1600"/>
+            <a:lvl4pPr marL="1028700" indent="0" algn="ctr">
+              <a:buNone/>
+              <a:defRPr sz="1200"/>
             </a:lvl4pPr>
-            <a:lvl5pPr marL="1828800" indent="0" algn="ctr">
-              <a:buNone/>
-              <a:defRPr sz="1600"/>
+            <a:lvl5pPr marL="1371600" indent="0" algn="ctr">
+              <a:buNone/>
+              <a:defRPr sz="1200"/>
             </a:lvl5pPr>
-            <a:lvl6pPr marL="2286000" indent="0" algn="ctr">
-              <a:buNone/>
-              <a:defRPr sz="1600"/>
+            <a:lvl6pPr marL="1714500" indent="0" algn="ctr">
+              <a:buNone/>
+              <a:defRPr sz="1200"/>
             </a:lvl6pPr>
-            <a:lvl7pPr marL="2743200" indent="0" algn="ctr">
-              <a:buNone/>
-              <a:defRPr sz="1600"/>
+            <a:lvl7pPr marL="2057400" indent="0" algn="ctr">
+              <a:buNone/>
+              <a:defRPr sz="1200"/>
             </a:lvl7pPr>
-            <a:lvl8pPr marL="3200400" indent="0" algn="ctr">
-              <a:buNone/>
-              <a:defRPr sz="1600"/>
+            <a:lvl8pPr marL="2400300" indent="0" algn="ctr">
+              <a:buNone/>
+              <a:defRPr sz="1200"/>
             </a:lvl8pPr>
-            <a:lvl9pPr marL="3657600" indent="0" algn="ctr">
-              <a:buNone/>
-              <a:defRPr sz="1600"/>
+            <a:lvl9pPr marL="2743200" indent="0" algn="ctr">
+              <a:buNone/>
+              <a:defRPr sz="1200"/>
             </a:lvl9pPr>
           </a:lstStyle>
           <a:p>
@@ -228,18 +222,13 @@
               <a:rPr lang="de-DE"/>
               <a:t>Master-Untertitelformat bearbeiten</a:t>
             </a:r>
-          </a:p>
-        </p:txBody>
-      </p:sp>
-      <p:sp>
-        <p:nvSpPr>
-          <p:cNvPr id="4" name="Datumsplatzhalter 3">
-            <a:extLst>
-              <a:ext uri="{FF2B5EF4-FFF2-40B4-BE49-F238E27FC236}">
-                <a16:creationId xmlns:a16="http://schemas.microsoft.com/office/drawing/2014/main" id="{563DE21E-E783-6F3F-375B-C33F9AC0BEAF}"/>
-              </a:ext>
-            </a:extLst>
-          </p:cNvPr>
+            <a:endParaRPr lang="en-US" dirty="0"/>
+          </a:p>
+        </p:txBody>
+      </p:sp>
+      <p:sp>
+        <p:nvSpPr>
+          <p:cNvPr id="4" name="Date Placeholder 3"/>
           <p:cNvSpPr>
             <a:spLocks noGrp="1"/>
           </p:cNvSpPr>
@@ -254,7 +243,7 @@
           <a:p>
             <a:fld id="{BF73B9A6-C276-4D0F-A316-0F89DCD331AD}" type="datetimeFigureOut">
               <a:rPr lang="de-DE" smtClean="0"/>
-              <a:t>29.09.2025</a:t>
+              <a:t>12.01.2026</a:t>
             </a:fld>
             <a:endParaRPr lang="de-DE"/>
           </a:p>
@@ -262,13 +251,7 @@
       </p:sp>
       <p:sp>
         <p:nvSpPr>
-          <p:cNvPr id="5" name="Fußzeilenplatzhalter 4">
-            <a:extLst>
-              <a:ext uri="{FF2B5EF4-FFF2-40B4-BE49-F238E27FC236}">
-                <a16:creationId xmlns:a16="http://schemas.microsoft.com/office/drawing/2014/main" id="{6373564E-3AF1-77A8-55F6-B41DD4F595BE}"/>
-              </a:ext>
-            </a:extLst>
-          </p:cNvPr>
+          <p:cNvPr id="5" name="Footer Placeholder 4"/>
           <p:cNvSpPr>
             <a:spLocks noGrp="1"/>
           </p:cNvSpPr>
@@ -287,13 +270,7 @@
       </p:sp>
       <p:sp>
         <p:nvSpPr>
-          <p:cNvPr id="6" name="Foliennummernplatzhalter 5">
-            <a:extLst>
-              <a:ext uri="{FF2B5EF4-FFF2-40B4-BE49-F238E27FC236}">
-                <a16:creationId xmlns:a16="http://schemas.microsoft.com/office/drawing/2014/main" id="{25CF21A5-5F79-2C69-EA84-7F7060769E58}"/>
-              </a:ext>
-            </a:extLst>
-          </p:cNvPr>
+          <p:cNvPr id="6" name="Slide Number Placeholder 5"/>
           <p:cNvSpPr>
             <a:spLocks noGrp="1"/>
           </p:cNvSpPr>
@@ -317,7 +294,7 @@
     </p:spTree>
     <p:extLst>
       <p:ext uri="{BB962C8B-B14F-4D97-AF65-F5344CB8AC3E}">
-        <p14:creationId xmlns:p14="http://schemas.microsoft.com/office/powerpoint/2010/main" val="1796841233"/>
+        <p14:creationId xmlns:p14="http://schemas.microsoft.com/office/powerpoint/2010/main" val="2020386611"/>
       </p:ext>
     </p:extLst>
   </p:cSld>
@@ -346,13 +323,7 @@
       </p:grpSpPr>
       <p:sp>
         <p:nvSpPr>
-          <p:cNvPr id="2" name="Titel 1">
-            <a:extLst>
-              <a:ext uri="{FF2B5EF4-FFF2-40B4-BE49-F238E27FC236}">
-                <a16:creationId xmlns:a16="http://schemas.microsoft.com/office/drawing/2014/main" id="{6E9B30D3-4067-0D80-661A-64DEE6154B54}"/>
-              </a:ext>
-            </a:extLst>
-          </p:cNvPr>
+          <p:cNvPr id="2" name="Title 1"/>
           <p:cNvSpPr>
             <a:spLocks noGrp="1"/>
           </p:cNvSpPr>
@@ -369,18 +340,13 @@
               <a:rPr lang="de-DE"/>
               <a:t>Mastertitelformat bearbeiten</a:t>
             </a:r>
-          </a:p>
-        </p:txBody>
-      </p:sp>
-      <p:sp>
-        <p:nvSpPr>
-          <p:cNvPr id="3" name="Vertikaler Textplatzhalter 2">
-            <a:extLst>
-              <a:ext uri="{FF2B5EF4-FFF2-40B4-BE49-F238E27FC236}">
-                <a16:creationId xmlns:a16="http://schemas.microsoft.com/office/drawing/2014/main" id="{A23DCF26-9778-DA16-CC49-D830563CD5D0}"/>
-              </a:ext>
-            </a:extLst>
-          </p:cNvPr>
+            <a:endParaRPr lang="en-US" dirty="0"/>
+          </a:p>
+        </p:txBody>
+      </p:sp>
+      <p:sp>
+        <p:nvSpPr>
+          <p:cNvPr id="3" name="Vertical Text Placeholder 2"/>
           <p:cNvSpPr>
             <a:spLocks noGrp="1"/>
           </p:cNvSpPr>
@@ -426,18 +392,13 @@
               <a:rPr lang="de-DE"/>
               <a:t>Fünfte Ebene</a:t>
             </a:r>
-          </a:p>
-        </p:txBody>
-      </p:sp>
-      <p:sp>
-        <p:nvSpPr>
-          <p:cNvPr id="4" name="Datumsplatzhalter 3">
-            <a:extLst>
-              <a:ext uri="{FF2B5EF4-FFF2-40B4-BE49-F238E27FC236}">
-                <a16:creationId xmlns:a16="http://schemas.microsoft.com/office/drawing/2014/main" id="{81AA7FE8-4988-2391-88DB-6E7432B41A4D}"/>
-              </a:ext>
-            </a:extLst>
-          </p:cNvPr>
+            <a:endParaRPr lang="en-US" dirty="0"/>
+          </a:p>
+        </p:txBody>
+      </p:sp>
+      <p:sp>
+        <p:nvSpPr>
+          <p:cNvPr id="4" name="Date Placeholder 3"/>
           <p:cNvSpPr>
             <a:spLocks noGrp="1"/>
           </p:cNvSpPr>
@@ -452,7 +413,7 @@
           <a:p>
             <a:fld id="{BF73B9A6-C276-4D0F-A316-0F89DCD331AD}" type="datetimeFigureOut">
               <a:rPr lang="de-DE" smtClean="0"/>
-              <a:t>29.09.2025</a:t>
+              <a:t>12.01.2026</a:t>
             </a:fld>
             <a:endParaRPr lang="de-DE"/>
           </a:p>
@@ -460,13 +421,7 @@
       </p:sp>
       <p:sp>
         <p:nvSpPr>
-          <p:cNvPr id="5" name="Fußzeilenplatzhalter 4">
-            <a:extLst>
-              <a:ext uri="{FF2B5EF4-FFF2-40B4-BE49-F238E27FC236}">
-                <a16:creationId xmlns:a16="http://schemas.microsoft.com/office/drawing/2014/main" id="{1CA1386C-C5F9-42E6-1757-87240F3EF89A}"/>
-              </a:ext>
-            </a:extLst>
-          </p:cNvPr>
+          <p:cNvPr id="5" name="Footer Placeholder 4"/>
           <p:cNvSpPr>
             <a:spLocks noGrp="1"/>
           </p:cNvSpPr>
@@ -485,13 +440,7 @@
       </p:sp>
       <p:sp>
         <p:nvSpPr>
-          <p:cNvPr id="6" name="Foliennummernplatzhalter 5">
-            <a:extLst>
-              <a:ext uri="{FF2B5EF4-FFF2-40B4-BE49-F238E27FC236}">
-                <a16:creationId xmlns:a16="http://schemas.microsoft.com/office/drawing/2014/main" id="{7D637DA3-8832-ACA3-E26B-46E591B69685}"/>
-              </a:ext>
-            </a:extLst>
-          </p:cNvPr>
+          <p:cNvPr id="6" name="Slide Number Placeholder 5"/>
           <p:cNvSpPr>
             <a:spLocks noGrp="1"/>
           </p:cNvSpPr>
@@ -515,7 +464,7 @@
     </p:spTree>
     <p:extLst>
       <p:ext uri="{BB962C8B-B14F-4D97-AF65-F5344CB8AC3E}">
-        <p14:creationId xmlns:p14="http://schemas.microsoft.com/office/powerpoint/2010/main" val="1127259610"/>
+        <p14:creationId xmlns:p14="http://schemas.microsoft.com/office/powerpoint/2010/main" val="3276952162"/>
       </p:ext>
     </p:extLst>
   </p:cSld>
@@ -544,13 +493,7 @@
       </p:grpSpPr>
       <p:sp>
         <p:nvSpPr>
-          <p:cNvPr id="2" name="Vertikaler Titel 1">
-            <a:extLst>
-              <a:ext uri="{FF2B5EF4-FFF2-40B4-BE49-F238E27FC236}">
-                <a16:creationId xmlns:a16="http://schemas.microsoft.com/office/drawing/2014/main" id="{C9C385C2-8BA5-E5CC-14EC-1713A92F47CE}"/>
-              </a:ext>
-            </a:extLst>
-          </p:cNvPr>
+          <p:cNvPr id="2" name="Vertical Title 1"/>
           <p:cNvSpPr>
             <a:spLocks noGrp="1"/>
           </p:cNvSpPr>
@@ -560,8 +503,8 @@
         </p:nvSpPr>
         <p:spPr>
           <a:xfrm>
-            <a:off x="8724900" y="365125"/>
-            <a:ext cx="2628900" cy="5811838"/>
+            <a:off x="6543675" y="273844"/>
+            <a:ext cx="1971675" cy="4358879"/>
           </a:xfrm>
         </p:spPr>
         <p:txBody>
@@ -572,18 +515,13 @@
               <a:rPr lang="de-DE"/>
               <a:t>Mastertitelformat bearbeiten</a:t>
             </a:r>
-          </a:p>
-        </p:txBody>
-      </p:sp>
-      <p:sp>
-        <p:nvSpPr>
-          <p:cNvPr id="3" name="Vertikaler Textplatzhalter 2">
-            <a:extLst>
-              <a:ext uri="{FF2B5EF4-FFF2-40B4-BE49-F238E27FC236}">
-                <a16:creationId xmlns:a16="http://schemas.microsoft.com/office/drawing/2014/main" id="{A730336F-2F0A-5E1A-4C35-2017B4510762}"/>
-              </a:ext>
-            </a:extLst>
-          </p:cNvPr>
+            <a:endParaRPr lang="en-US" dirty="0"/>
+          </a:p>
+        </p:txBody>
+      </p:sp>
+      <p:sp>
+        <p:nvSpPr>
+          <p:cNvPr id="3" name="Vertical Text Placeholder 2"/>
           <p:cNvSpPr>
             <a:spLocks noGrp="1"/>
           </p:cNvSpPr>
@@ -593,8 +531,8 @@
         </p:nvSpPr>
         <p:spPr>
           <a:xfrm>
-            <a:off x="838200" y="365125"/>
-            <a:ext cx="7734300" cy="5811838"/>
+            <a:off x="628650" y="273844"/>
+            <a:ext cx="5800725" cy="4358879"/>
           </a:xfrm>
         </p:spPr>
         <p:txBody>
@@ -634,18 +572,13 @@
               <a:rPr lang="de-DE"/>
               <a:t>Fünfte Ebene</a:t>
             </a:r>
-          </a:p>
-        </p:txBody>
-      </p:sp>
-      <p:sp>
-        <p:nvSpPr>
-          <p:cNvPr id="4" name="Datumsplatzhalter 3">
-            <a:extLst>
-              <a:ext uri="{FF2B5EF4-FFF2-40B4-BE49-F238E27FC236}">
-                <a16:creationId xmlns:a16="http://schemas.microsoft.com/office/drawing/2014/main" id="{C8C0AA2C-010F-A284-B25D-A4A7F4B8C384}"/>
-              </a:ext>
-            </a:extLst>
-          </p:cNvPr>
+            <a:endParaRPr lang="en-US" dirty="0"/>
+          </a:p>
+        </p:txBody>
+      </p:sp>
+      <p:sp>
+        <p:nvSpPr>
+          <p:cNvPr id="4" name="Date Placeholder 3"/>
           <p:cNvSpPr>
             <a:spLocks noGrp="1"/>
           </p:cNvSpPr>
@@ -660,7 +593,7 @@
           <a:p>
             <a:fld id="{BF73B9A6-C276-4D0F-A316-0F89DCD331AD}" type="datetimeFigureOut">
               <a:rPr lang="de-DE" smtClean="0"/>
-              <a:t>29.09.2025</a:t>
+              <a:t>12.01.2026</a:t>
             </a:fld>
             <a:endParaRPr lang="de-DE"/>
           </a:p>
@@ -668,13 +601,7 @@
       </p:sp>
       <p:sp>
         <p:nvSpPr>
-          <p:cNvPr id="5" name="Fußzeilenplatzhalter 4">
-            <a:extLst>
-              <a:ext uri="{FF2B5EF4-FFF2-40B4-BE49-F238E27FC236}">
-                <a16:creationId xmlns:a16="http://schemas.microsoft.com/office/drawing/2014/main" id="{E570C607-6614-A573-40D2-33B11FD708F4}"/>
-              </a:ext>
-            </a:extLst>
-          </p:cNvPr>
+          <p:cNvPr id="5" name="Footer Placeholder 4"/>
           <p:cNvSpPr>
             <a:spLocks noGrp="1"/>
           </p:cNvSpPr>
@@ -693,13 +620,7 @@
       </p:sp>
       <p:sp>
         <p:nvSpPr>
-          <p:cNvPr id="6" name="Foliennummernplatzhalter 5">
-            <a:extLst>
-              <a:ext uri="{FF2B5EF4-FFF2-40B4-BE49-F238E27FC236}">
-                <a16:creationId xmlns:a16="http://schemas.microsoft.com/office/drawing/2014/main" id="{71480B32-69B0-A418-A3A3-E171D087BE62}"/>
-              </a:ext>
-            </a:extLst>
-          </p:cNvPr>
+          <p:cNvPr id="6" name="Slide Number Placeholder 5"/>
           <p:cNvSpPr>
             <a:spLocks noGrp="1"/>
           </p:cNvSpPr>
@@ -723,7 +644,7 @@
     </p:spTree>
     <p:extLst>
       <p:ext uri="{BB962C8B-B14F-4D97-AF65-F5344CB8AC3E}">
-        <p14:creationId xmlns:p14="http://schemas.microsoft.com/office/powerpoint/2010/main" val="1310902305"/>
+        <p14:creationId xmlns:p14="http://schemas.microsoft.com/office/powerpoint/2010/main" val="3128321504"/>
       </p:ext>
     </p:extLst>
   </p:cSld>
@@ -752,13 +673,7 @@
       </p:grpSpPr>
       <p:sp>
         <p:nvSpPr>
-          <p:cNvPr id="2" name="Titel 1">
-            <a:extLst>
-              <a:ext uri="{FF2B5EF4-FFF2-40B4-BE49-F238E27FC236}">
-                <a16:creationId xmlns:a16="http://schemas.microsoft.com/office/drawing/2014/main" id="{99674D01-82AD-1B5B-6D10-A8A088CB761E}"/>
-              </a:ext>
-            </a:extLst>
-          </p:cNvPr>
+          <p:cNvPr id="2" name="Title 1"/>
           <p:cNvSpPr>
             <a:spLocks noGrp="1"/>
           </p:cNvSpPr>
@@ -775,18 +690,13 @@
               <a:rPr lang="de-DE"/>
               <a:t>Mastertitelformat bearbeiten</a:t>
             </a:r>
-          </a:p>
-        </p:txBody>
-      </p:sp>
-      <p:sp>
-        <p:nvSpPr>
-          <p:cNvPr id="3" name="Inhaltsplatzhalter 2">
-            <a:extLst>
-              <a:ext uri="{FF2B5EF4-FFF2-40B4-BE49-F238E27FC236}">
-                <a16:creationId xmlns:a16="http://schemas.microsoft.com/office/drawing/2014/main" id="{59AC9B55-CE6C-55ED-DF21-E842EADBE24B}"/>
-              </a:ext>
-            </a:extLst>
-          </p:cNvPr>
+            <a:endParaRPr lang="en-US" dirty="0"/>
+          </a:p>
+        </p:txBody>
+      </p:sp>
+      <p:sp>
+        <p:nvSpPr>
+          <p:cNvPr id="3" name="Content Placeholder 2"/>
           <p:cNvSpPr>
             <a:spLocks noGrp="1"/>
           </p:cNvSpPr>
@@ -832,18 +742,13 @@
               <a:rPr lang="de-DE"/>
               <a:t>Fünfte Ebene</a:t>
             </a:r>
-          </a:p>
-        </p:txBody>
-      </p:sp>
-      <p:sp>
-        <p:nvSpPr>
-          <p:cNvPr id="4" name="Datumsplatzhalter 3">
-            <a:extLst>
-              <a:ext uri="{FF2B5EF4-FFF2-40B4-BE49-F238E27FC236}">
-                <a16:creationId xmlns:a16="http://schemas.microsoft.com/office/drawing/2014/main" id="{F3792FB3-77B0-1A68-7E40-B9CE0325EBAD}"/>
-              </a:ext>
-            </a:extLst>
-          </p:cNvPr>
+            <a:endParaRPr lang="en-US" dirty="0"/>
+          </a:p>
+        </p:txBody>
+      </p:sp>
+      <p:sp>
+        <p:nvSpPr>
+          <p:cNvPr id="4" name="Date Placeholder 3"/>
           <p:cNvSpPr>
             <a:spLocks noGrp="1"/>
           </p:cNvSpPr>
@@ -858,7 +763,7 @@
           <a:p>
             <a:fld id="{BF73B9A6-C276-4D0F-A316-0F89DCD331AD}" type="datetimeFigureOut">
               <a:rPr lang="de-DE" smtClean="0"/>
-              <a:t>29.09.2025</a:t>
+              <a:t>12.01.2026</a:t>
             </a:fld>
             <a:endParaRPr lang="de-DE"/>
           </a:p>
@@ -866,13 +771,7 @@
       </p:sp>
       <p:sp>
         <p:nvSpPr>
-          <p:cNvPr id="5" name="Fußzeilenplatzhalter 4">
-            <a:extLst>
-              <a:ext uri="{FF2B5EF4-FFF2-40B4-BE49-F238E27FC236}">
-                <a16:creationId xmlns:a16="http://schemas.microsoft.com/office/drawing/2014/main" id="{70FE312B-CCE4-D33E-3649-23DAC6E0D9E7}"/>
-              </a:ext>
-            </a:extLst>
-          </p:cNvPr>
+          <p:cNvPr id="5" name="Footer Placeholder 4"/>
           <p:cNvSpPr>
             <a:spLocks noGrp="1"/>
           </p:cNvSpPr>
@@ -891,13 +790,7 @@
       </p:sp>
       <p:sp>
         <p:nvSpPr>
-          <p:cNvPr id="6" name="Foliennummernplatzhalter 5">
-            <a:extLst>
-              <a:ext uri="{FF2B5EF4-FFF2-40B4-BE49-F238E27FC236}">
-                <a16:creationId xmlns:a16="http://schemas.microsoft.com/office/drawing/2014/main" id="{EED1FC2E-33FC-EBED-6BA2-35ED5C905F55}"/>
-              </a:ext>
-            </a:extLst>
-          </p:cNvPr>
+          <p:cNvPr id="6" name="Slide Number Placeholder 5"/>
           <p:cNvSpPr>
             <a:spLocks noGrp="1"/>
           </p:cNvSpPr>
@@ -921,7 +814,7 @@
     </p:spTree>
     <p:extLst>
       <p:ext uri="{BB962C8B-B14F-4D97-AF65-F5344CB8AC3E}">
-        <p14:creationId xmlns:p14="http://schemas.microsoft.com/office/powerpoint/2010/main" val="3711725520"/>
+        <p14:creationId xmlns:p14="http://schemas.microsoft.com/office/powerpoint/2010/main" val="690335858"/>
       </p:ext>
     </p:extLst>
   </p:cSld>
@@ -950,13 +843,7 @@
       </p:grpSpPr>
       <p:sp>
         <p:nvSpPr>
-          <p:cNvPr id="2" name="Titel 1">
-            <a:extLst>
-              <a:ext uri="{FF2B5EF4-FFF2-40B4-BE49-F238E27FC236}">
-                <a16:creationId xmlns:a16="http://schemas.microsoft.com/office/drawing/2014/main" id="{E116AA87-55CA-1C00-F9FA-061A05AC072A}"/>
-              </a:ext>
-            </a:extLst>
-          </p:cNvPr>
+          <p:cNvPr id="2" name="Title 1"/>
           <p:cNvSpPr>
             <a:spLocks noGrp="1"/>
           </p:cNvSpPr>
@@ -966,15 +853,15 @@
         </p:nvSpPr>
         <p:spPr>
           <a:xfrm>
-            <a:off x="831850" y="1709738"/>
-            <a:ext cx="10515600" cy="2852737"/>
+            <a:off x="623888" y="1282304"/>
+            <a:ext cx="7886700" cy="2139553"/>
           </a:xfrm>
         </p:spPr>
         <p:txBody>
           <a:bodyPr anchor="b"/>
           <a:lstStyle>
             <a:lvl1pPr>
-              <a:defRPr sz="6000"/>
+              <a:defRPr sz="4500"/>
             </a:lvl1pPr>
           </a:lstStyle>
           <a:p>
@@ -982,18 +869,13 @@
               <a:rPr lang="de-DE"/>
               <a:t>Mastertitelformat bearbeiten</a:t>
             </a:r>
-          </a:p>
-        </p:txBody>
-      </p:sp>
-      <p:sp>
-        <p:nvSpPr>
-          <p:cNvPr id="3" name="Textplatzhalter 2">
-            <a:extLst>
-              <a:ext uri="{FF2B5EF4-FFF2-40B4-BE49-F238E27FC236}">
-                <a16:creationId xmlns:a16="http://schemas.microsoft.com/office/drawing/2014/main" id="{179A5390-801A-9392-D16F-990266B09D6E}"/>
-              </a:ext>
-            </a:extLst>
-          </p:cNvPr>
+            <a:endParaRPr lang="en-US" dirty="0"/>
+          </a:p>
+        </p:txBody>
+      </p:sp>
+      <p:sp>
+        <p:nvSpPr>
+          <p:cNvPr id="3" name="Text Placeholder 2"/>
           <p:cNvSpPr>
             <a:spLocks noGrp="1"/>
           </p:cNvSpPr>
@@ -1003,8 +885,8 @@
         </p:nvSpPr>
         <p:spPr>
           <a:xfrm>
-            <a:off x="831850" y="4589463"/>
-            <a:ext cx="10515600" cy="1500187"/>
+            <a:off x="623888" y="3442098"/>
+            <a:ext cx="7886700" cy="1125140"/>
           </a:xfrm>
         </p:spPr>
         <p:txBody>
@@ -1012,7 +894,7 @@
           <a:lstStyle>
             <a:lvl1pPr marL="0" indent="0">
               <a:buNone/>
-              <a:defRPr sz="2400">
+              <a:defRPr sz="1800">
                 <a:solidFill>
                   <a:schemeClr val="tx1">
                     <a:tint val="82000"/>
@@ -1020,9 +902,9 @@
                 </a:solidFill>
               </a:defRPr>
             </a:lvl1pPr>
-            <a:lvl2pPr marL="457200" indent="0">
-              <a:buNone/>
-              <a:defRPr sz="2000">
+            <a:lvl2pPr marL="342900" indent="0">
+              <a:buNone/>
+              <a:defRPr sz="1500">
                 <a:solidFill>
                   <a:schemeClr val="tx1">
                     <a:tint val="82000"/>
@@ -1030,9 +912,9 @@
                 </a:solidFill>
               </a:defRPr>
             </a:lvl2pPr>
-            <a:lvl3pPr marL="914400" indent="0">
-              <a:buNone/>
-              <a:defRPr sz="1800">
+            <a:lvl3pPr marL="685800" indent="0">
+              <a:buNone/>
+              <a:defRPr sz="1350">
                 <a:solidFill>
                   <a:schemeClr val="tx1">
                     <a:tint val="82000"/>
@@ -1040,9 +922,9 @@
                 </a:solidFill>
               </a:defRPr>
             </a:lvl3pPr>
-            <a:lvl4pPr marL="1371600" indent="0">
-              <a:buNone/>
-              <a:defRPr sz="1600">
+            <a:lvl4pPr marL="1028700" indent="0">
+              <a:buNone/>
+              <a:defRPr sz="1200">
                 <a:solidFill>
                   <a:schemeClr val="tx1">
                     <a:tint val="82000"/>
@@ -1050,9 +932,9 @@
                 </a:solidFill>
               </a:defRPr>
             </a:lvl4pPr>
-            <a:lvl5pPr marL="1828800" indent="0">
-              <a:buNone/>
-              <a:defRPr sz="1600">
+            <a:lvl5pPr marL="1371600" indent="0">
+              <a:buNone/>
+              <a:defRPr sz="1200">
                 <a:solidFill>
                   <a:schemeClr val="tx1">
                     <a:tint val="82000"/>
@@ -1060,9 +942,9 @@
                 </a:solidFill>
               </a:defRPr>
             </a:lvl5pPr>
-            <a:lvl6pPr marL="2286000" indent="0">
-              <a:buNone/>
-              <a:defRPr sz="1600">
+            <a:lvl6pPr marL="1714500" indent="0">
+              <a:buNone/>
+              <a:defRPr sz="1200">
                 <a:solidFill>
                   <a:schemeClr val="tx1">
                     <a:tint val="82000"/>
@@ -1070,9 +952,9 @@
                 </a:solidFill>
               </a:defRPr>
             </a:lvl6pPr>
-            <a:lvl7pPr marL="2743200" indent="0">
-              <a:buNone/>
-              <a:defRPr sz="1600">
+            <a:lvl7pPr marL="2057400" indent="0">
+              <a:buNone/>
+              <a:defRPr sz="1200">
                 <a:solidFill>
                   <a:schemeClr val="tx1">
                     <a:tint val="82000"/>
@@ -1080,9 +962,9 @@
                 </a:solidFill>
               </a:defRPr>
             </a:lvl7pPr>
-            <a:lvl8pPr marL="3200400" indent="0">
-              <a:buNone/>
-              <a:defRPr sz="1600">
+            <a:lvl8pPr marL="2400300" indent="0">
+              <a:buNone/>
+              <a:defRPr sz="1200">
                 <a:solidFill>
                   <a:schemeClr val="tx1">
                     <a:tint val="82000"/>
@@ -1090,9 +972,9 @@
                 </a:solidFill>
               </a:defRPr>
             </a:lvl8pPr>
-            <a:lvl9pPr marL="3657600" indent="0">
-              <a:buNone/>
-              <a:defRPr sz="1600">
+            <a:lvl9pPr marL="2743200" indent="0">
+              <a:buNone/>
+              <a:defRPr sz="1200">
                 <a:solidFill>
                   <a:schemeClr val="tx1">
                     <a:tint val="82000"/>
@@ -1112,13 +994,7 @@
       </p:sp>
       <p:sp>
         <p:nvSpPr>
-          <p:cNvPr id="4" name="Datumsplatzhalter 3">
-            <a:extLst>
-              <a:ext uri="{FF2B5EF4-FFF2-40B4-BE49-F238E27FC236}">
-                <a16:creationId xmlns:a16="http://schemas.microsoft.com/office/drawing/2014/main" id="{DC73BC7A-FE66-8C1A-6306-3DEFFC356FB8}"/>
-              </a:ext>
-            </a:extLst>
-          </p:cNvPr>
+          <p:cNvPr id="4" name="Date Placeholder 3"/>
           <p:cNvSpPr>
             <a:spLocks noGrp="1"/>
           </p:cNvSpPr>
@@ -1133,7 +1009,7 @@
           <a:p>
             <a:fld id="{BF73B9A6-C276-4D0F-A316-0F89DCD331AD}" type="datetimeFigureOut">
               <a:rPr lang="de-DE" smtClean="0"/>
-              <a:t>29.09.2025</a:t>
+              <a:t>12.01.2026</a:t>
             </a:fld>
             <a:endParaRPr lang="de-DE"/>
           </a:p>
@@ -1141,13 +1017,7 @@
       </p:sp>
       <p:sp>
         <p:nvSpPr>
-          <p:cNvPr id="5" name="Fußzeilenplatzhalter 4">
-            <a:extLst>
-              <a:ext uri="{FF2B5EF4-FFF2-40B4-BE49-F238E27FC236}">
-                <a16:creationId xmlns:a16="http://schemas.microsoft.com/office/drawing/2014/main" id="{5A8A51CC-FA38-0582-E354-3D9BA1B1DE1C}"/>
-              </a:ext>
-            </a:extLst>
-          </p:cNvPr>
+          <p:cNvPr id="5" name="Footer Placeholder 4"/>
           <p:cNvSpPr>
             <a:spLocks noGrp="1"/>
           </p:cNvSpPr>
@@ -1166,13 +1036,7 @@
       </p:sp>
       <p:sp>
         <p:nvSpPr>
-          <p:cNvPr id="6" name="Foliennummernplatzhalter 5">
-            <a:extLst>
-              <a:ext uri="{FF2B5EF4-FFF2-40B4-BE49-F238E27FC236}">
-                <a16:creationId xmlns:a16="http://schemas.microsoft.com/office/drawing/2014/main" id="{EF083F42-C42D-537A-12B6-7900327F21D6}"/>
-              </a:ext>
-            </a:extLst>
-          </p:cNvPr>
+          <p:cNvPr id="6" name="Slide Number Placeholder 5"/>
           <p:cNvSpPr>
             <a:spLocks noGrp="1"/>
           </p:cNvSpPr>
@@ -1196,7 +1060,7 @@
     </p:spTree>
     <p:extLst>
       <p:ext uri="{BB962C8B-B14F-4D97-AF65-F5344CB8AC3E}">
-        <p14:creationId xmlns:p14="http://schemas.microsoft.com/office/powerpoint/2010/main" val="348409688"/>
+        <p14:creationId xmlns:p14="http://schemas.microsoft.com/office/powerpoint/2010/main" val="662122310"/>
       </p:ext>
     </p:extLst>
   </p:cSld>
@@ -1225,13 +1089,7 @@
       </p:grpSpPr>
       <p:sp>
         <p:nvSpPr>
-          <p:cNvPr id="2" name="Titel 1">
-            <a:extLst>
-              <a:ext uri="{FF2B5EF4-FFF2-40B4-BE49-F238E27FC236}">
-                <a16:creationId xmlns:a16="http://schemas.microsoft.com/office/drawing/2014/main" id="{759EE073-94E6-9408-5BD1-FDB981DA6FBA}"/>
-              </a:ext>
-            </a:extLst>
-          </p:cNvPr>
+          <p:cNvPr id="2" name="Title 1"/>
           <p:cNvSpPr>
             <a:spLocks noGrp="1"/>
           </p:cNvSpPr>
@@ -1248,18 +1106,13 @@
               <a:rPr lang="de-DE"/>
               <a:t>Mastertitelformat bearbeiten</a:t>
             </a:r>
-          </a:p>
-        </p:txBody>
-      </p:sp>
-      <p:sp>
-        <p:nvSpPr>
-          <p:cNvPr id="3" name="Inhaltsplatzhalter 2">
-            <a:extLst>
-              <a:ext uri="{FF2B5EF4-FFF2-40B4-BE49-F238E27FC236}">
-                <a16:creationId xmlns:a16="http://schemas.microsoft.com/office/drawing/2014/main" id="{1B12221B-C680-2241-569C-2286E6672F46}"/>
-              </a:ext>
-            </a:extLst>
-          </p:cNvPr>
+            <a:endParaRPr lang="en-US" dirty="0"/>
+          </a:p>
+        </p:txBody>
+      </p:sp>
+      <p:sp>
+        <p:nvSpPr>
+          <p:cNvPr id="3" name="Content Placeholder 2"/>
           <p:cNvSpPr>
             <a:spLocks noGrp="1"/>
           </p:cNvSpPr>
@@ -1269,8 +1122,8 @@
         </p:nvSpPr>
         <p:spPr>
           <a:xfrm>
-            <a:off x="838200" y="1825625"/>
-            <a:ext cx="5181600" cy="4351338"/>
+            <a:off x="628650" y="1369219"/>
+            <a:ext cx="3886200" cy="3263504"/>
           </a:xfrm>
         </p:spPr>
         <p:txBody>
@@ -1310,18 +1163,13 @@
               <a:rPr lang="de-DE"/>
               <a:t>Fünfte Ebene</a:t>
             </a:r>
-          </a:p>
-        </p:txBody>
-      </p:sp>
-      <p:sp>
-        <p:nvSpPr>
-          <p:cNvPr id="4" name="Inhaltsplatzhalter 3">
-            <a:extLst>
-              <a:ext uri="{FF2B5EF4-FFF2-40B4-BE49-F238E27FC236}">
-                <a16:creationId xmlns:a16="http://schemas.microsoft.com/office/drawing/2014/main" id="{10CCE5F5-966D-856B-4FED-B247F3B68DCE}"/>
-              </a:ext>
-            </a:extLst>
-          </p:cNvPr>
+            <a:endParaRPr lang="en-US" dirty="0"/>
+          </a:p>
+        </p:txBody>
+      </p:sp>
+      <p:sp>
+        <p:nvSpPr>
+          <p:cNvPr id="4" name="Content Placeholder 3"/>
           <p:cNvSpPr>
             <a:spLocks noGrp="1"/>
           </p:cNvSpPr>
@@ -1331,8 +1179,8 @@
         </p:nvSpPr>
         <p:spPr>
           <a:xfrm>
-            <a:off x="6172200" y="1825625"/>
-            <a:ext cx="5181600" cy="4351338"/>
+            <a:off x="4629150" y="1369219"/>
+            <a:ext cx="3886200" cy="3263504"/>
           </a:xfrm>
         </p:spPr>
         <p:txBody>
@@ -1372,18 +1220,13 @@
               <a:rPr lang="de-DE"/>
               <a:t>Fünfte Ebene</a:t>
             </a:r>
-          </a:p>
-        </p:txBody>
-      </p:sp>
-      <p:sp>
-        <p:nvSpPr>
-          <p:cNvPr id="5" name="Datumsplatzhalter 4">
-            <a:extLst>
-              <a:ext uri="{FF2B5EF4-FFF2-40B4-BE49-F238E27FC236}">
-                <a16:creationId xmlns:a16="http://schemas.microsoft.com/office/drawing/2014/main" id="{A5033470-604C-F9F8-401E-65683897248A}"/>
-              </a:ext>
-            </a:extLst>
-          </p:cNvPr>
+            <a:endParaRPr lang="en-US" dirty="0"/>
+          </a:p>
+        </p:txBody>
+      </p:sp>
+      <p:sp>
+        <p:nvSpPr>
+          <p:cNvPr id="5" name="Date Placeholder 4"/>
           <p:cNvSpPr>
             <a:spLocks noGrp="1"/>
           </p:cNvSpPr>
@@ -1398,7 +1241,7 @@
           <a:p>
             <a:fld id="{BF73B9A6-C276-4D0F-A316-0F89DCD331AD}" type="datetimeFigureOut">
               <a:rPr lang="de-DE" smtClean="0"/>
-              <a:t>29.09.2025</a:t>
+              <a:t>12.01.2026</a:t>
             </a:fld>
             <a:endParaRPr lang="de-DE"/>
           </a:p>
@@ -1406,13 +1249,7 @@
       </p:sp>
       <p:sp>
         <p:nvSpPr>
-          <p:cNvPr id="6" name="Fußzeilenplatzhalter 5">
-            <a:extLst>
-              <a:ext uri="{FF2B5EF4-FFF2-40B4-BE49-F238E27FC236}">
-                <a16:creationId xmlns:a16="http://schemas.microsoft.com/office/drawing/2014/main" id="{870F8AAC-9287-9781-D29F-F90B1D697DD7}"/>
-              </a:ext>
-            </a:extLst>
-          </p:cNvPr>
+          <p:cNvPr id="6" name="Footer Placeholder 5"/>
           <p:cNvSpPr>
             <a:spLocks noGrp="1"/>
           </p:cNvSpPr>
@@ -1431,13 +1268,7 @@
       </p:sp>
       <p:sp>
         <p:nvSpPr>
-          <p:cNvPr id="7" name="Foliennummernplatzhalter 6">
-            <a:extLst>
-              <a:ext uri="{FF2B5EF4-FFF2-40B4-BE49-F238E27FC236}">
-                <a16:creationId xmlns:a16="http://schemas.microsoft.com/office/drawing/2014/main" id="{CFECDBAC-FFD9-76EC-8DD6-2B4C851919B9}"/>
-              </a:ext>
-            </a:extLst>
-          </p:cNvPr>
+          <p:cNvPr id="7" name="Slide Number Placeholder 6"/>
           <p:cNvSpPr>
             <a:spLocks noGrp="1"/>
           </p:cNvSpPr>
@@ -1461,7 +1292,7 @@
     </p:spTree>
     <p:extLst>
       <p:ext uri="{BB962C8B-B14F-4D97-AF65-F5344CB8AC3E}">
-        <p14:creationId xmlns:p14="http://schemas.microsoft.com/office/powerpoint/2010/main" val="4261198325"/>
+        <p14:creationId xmlns:p14="http://schemas.microsoft.com/office/powerpoint/2010/main" val="1947934576"/>
       </p:ext>
     </p:extLst>
   </p:cSld>
@@ -1490,13 +1321,7 @@
       </p:grpSpPr>
       <p:sp>
         <p:nvSpPr>
-          <p:cNvPr id="2" name="Titel 1">
-            <a:extLst>
-              <a:ext uri="{FF2B5EF4-FFF2-40B4-BE49-F238E27FC236}">
-                <a16:creationId xmlns:a16="http://schemas.microsoft.com/office/drawing/2014/main" id="{CD9A8179-920D-FDFF-7684-E8F0D70307B8}"/>
-              </a:ext>
-            </a:extLst>
-          </p:cNvPr>
+          <p:cNvPr id="2" name="Title 1"/>
           <p:cNvSpPr>
             <a:spLocks noGrp="1"/>
           </p:cNvSpPr>
@@ -1506,8 +1331,8 @@
         </p:nvSpPr>
         <p:spPr>
           <a:xfrm>
-            <a:off x="839788" y="365125"/>
-            <a:ext cx="10515600" cy="1325563"/>
+            <a:off x="629841" y="273844"/>
+            <a:ext cx="7886700" cy="994172"/>
           </a:xfrm>
         </p:spPr>
         <p:txBody>
@@ -1518,18 +1343,13 @@
               <a:rPr lang="de-DE"/>
               <a:t>Mastertitelformat bearbeiten</a:t>
             </a:r>
-          </a:p>
-        </p:txBody>
-      </p:sp>
-      <p:sp>
-        <p:nvSpPr>
-          <p:cNvPr id="3" name="Textplatzhalter 2">
-            <a:extLst>
-              <a:ext uri="{FF2B5EF4-FFF2-40B4-BE49-F238E27FC236}">
-                <a16:creationId xmlns:a16="http://schemas.microsoft.com/office/drawing/2014/main" id="{09E43387-BA8F-94E2-9D23-C65C9424E63F}"/>
-              </a:ext>
-            </a:extLst>
-          </p:cNvPr>
+            <a:endParaRPr lang="en-US" dirty="0"/>
+          </a:p>
+        </p:txBody>
+      </p:sp>
+      <p:sp>
+        <p:nvSpPr>
+          <p:cNvPr id="3" name="Text Placeholder 2"/>
           <p:cNvSpPr>
             <a:spLocks noGrp="1"/>
           </p:cNvSpPr>
@@ -1539,8 +1359,8 @@
         </p:nvSpPr>
         <p:spPr>
           <a:xfrm>
-            <a:off x="839788" y="1681163"/>
-            <a:ext cx="5157787" cy="823912"/>
+            <a:off x="629842" y="1260872"/>
+            <a:ext cx="3868340" cy="617934"/>
           </a:xfrm>
         </p:spPr>
         <p:txBody>
@@ -1548,39 +1368,39 @@
           <a:lstStyle>
             <a:lvl1pPr marL="0" indent="0">
               <a:buNone/>
-              <a:defRPr sz="2400" b="1"/>
+              <a:defRPr sz="1800" b="1"/>
             </a:lvl1pPr>
-            <a:lvl2pPr marL="457200" indent="0">
-              <a:buNone/>
-              <a:defRPr sz="2000" b="1"/>
+            <a:lvl2pPr marL="342900" indent="0">
+              <a:buNone/>
+              <a:defRPr sz="1500" b="1"/>
             </a:lvl2pPr>
-            <a:lvl3pPr marL="914400" indent="0">
-              <a:buNone/>
-              <a:defRPr sz="1800" b="1"/>
+            <a:lvl3pPr marL="685800" indent="0">
+              <a:buNone/>
+              <a:defRPr sz="1350" b="1"/>
             </a:lvl3pPr>
-            <a:lvl4pPr marL="1371600" indent="0">
-              <a:buNone/>
-              <a:defRPr sz="1600" b="1"/>
+            <a:lvl4pPr marL="1028700" indent="0">
+              <a:buNone/>
+              <a:defRPr sz="1200" b="1"/>
             </a:lvl4pPr>
-            <a:lvl5pPr marL="1828800" indent="0">
-              <a:buNone/>
-              <a:defRPr sz="1600" b="1"/>
+            <a:lvl5pPr marL="1371600" indent="0">
+              <a:buNone/>
+              <a:defRPr sz="1200" b="1"/>
             </a:lvl5pPr>
-            <a:lvl6pPr marL="2286000" indent="0">
-              <a:buNone/>
-              <a:defRPr sz="1600" b="1"/>
+            <a:lvl6pPr marL="1714500" indent="0">
+              <a:buNone/>
+              <a:defRPr sz="1200" b="1"/>
             </a:lvl6pPr>
-            <a:lvl7pPr marL="2743200" indent="0">
-              <a:buNone/>
-              <a:defRPr sz="1600" b="1"/>
+            <a:lvl7pPr marL="2057400" indent="0">
+              <a:buNone/>
+              <a:defRPr sz="1200" b="1"/>
             </a:lvl7pPr>
-            <a:lvl8pPr marL="3200400" indent="0">
-              <a:buNone/>
-              <a:defRPr sz="1600" b="1"/>
+            <a:lvl8pPr marL="2400300" indent="0">
+              <a:buNone/>
+              <a:defRPr sz="1200" b="1"/>
             </a:lvl8pPr>
-            <a:lvl9pPr marL="3657600" indent="0">
-              <a:buNone/>
-              <a:defRPr sz="1600" b="1"/>
+            <a:lvl9pPr marL="2743200" indent="0">
+              <a:buNone/>
+              <a:defRPr sz="1200" b="1"/>
             </a:lvl9pPr>
           </a:lstStyle>
           <a:p>
@@ -1594,13 +1414,7 @@
       </p:sp>
       <p:sp>
         <p:nvSpPr>
-          <p:cNvPr id="4" name="Inhaltsplatzhalter 3">
-            <a:extLst>
-              <a:ext uri="{FF2B5EF4-FFF2-40B4-BE49-F238E27FC236}">
-                <a16:creationId xmlns:a16="http://schemas.microsoft.com/office/drawing/2014/main" id="{9295470D-DA95-95DF-AD33-90578CA47567}"/>
-              </a:ext>
-            </a:extLst>
-          </p:cNvPr>
+          <p:cNvPr id="4" name="Content Placeholder 3"/>
           <p:cNvSpPr>
             <a:spLocks noGrp="1"/>
           </p:cNvSpPr>
@@ -1610,8 +1424,8 @@
         </p:nvSpPr>
         <p:spPr>
           <a:xfrm>
-            <a:off x="839788" y="2505075"/>
-            <a:ext cx="5157787" cy="3684588"/>
+            <a:off x="629842" y="1878806"/>
+            <a:ext cx="3868340" cy="2763441"/>
           </a:xfrm>
         </p:spPr>
         <p:txBody>
@@ -1651,18 +1465,13 @@
               <a:rPr lang="de-DE"/>
               <a:t>Fünfte Ebene</a:t>
             </a:r>
-          </a:p>
-        </p:txBody>
-      </p:sp>
-      <p:sp>
-        <p:nvSpPr>
-          <p:cNvPr id="5" name="Textplatzhalter 4">
-            <a:extLst>
-              <a:ext uri="{FF2B5EF4-FFF2-40B4-BE49-F238E27FC236}">
-                <a16:creationId xmlns:a16="http://schemas.microsoft.com/office/drawing/2014/main" id="{4FF04E94-9B65-0608-2F63-F024771A5DD0}"/>
-              </a:ext>
-            </a:extLst>
-          </p:cNvPr>
+            <a:endParaRPr lang="en-US" dirty="0"/>
+          </a:p>
+        </p:txBody>
+      </p:sp>
+      <p:sp>
+        <p:nvSpPr>
+          <p:cNvPr id="5" name="Text Placeholder 4"/>
           <p:cNvSpPr>
             <a:spLocks noGrp="1"/>
           </p:cNvSpPr>
@@ -1672,8 +1481,8 @@
         </p:nvSpPr>
         <p:spPr>
           <a:xfrm>
-            <a:off x="6172200" y="1681163"/>
-            <a:ext cx="5183188" cy="823912"/>
+            <a:off x="4629150" y="1260872"/>
+            <a:ext cx="3887391" cy="617934"/>
           </a:xfrm>
         </p:spPr>
         <p:txBody>
@@ -1681,39 +1490,39 @@
           <a:lstStyle>
             <a:lvl1pPr marL="0" indent="0">
               <a:buNone/>
-              <a:defRPr sz="2400" b="1"/>
+              <a:defRPr sz="1800" b="1"/>
             </a:lvl1pPr>
-            <a:lvl2pPr marL="457200" indent="0">
-              <a:buNone/>
-              <a:defRPr sz="2000" b="1"/>
+            <a:lvl2pPr marL="342900" indent="0">
+              <a:buNone/>
+              <a:defRPr sz="1500" b="1"/>
             </a:lvl2pPr>
-            <a:lvl3pPr marL="914400" indent="0">
-              <a:buNone/>
-              <a:defRPr sz="1800" b="1"/>
+            <a:lvl3pPr marL="685800" indent="0">
+              <a:buNone/>
+              <a:defRPr sz="1350" b="1"/>
             </a:lvl3pPr>
-            <a:lvl4pPr marL="1371600" indent="0">
-              <a:buNone/>
-              <a:defRPr sz="1600" b="1"/>
+            <a:lvl4pPr marL="1028700" indent="0">
+              <a:buNone/>
+              <a:defRPr sz="1200" b="1"/>
             </a:lvl4pPr>
-            <a:lvl5pPr marL="1828800" indent="0">
-              <a:buNone/>
-              <a:defRPr sz="1600" b="1"/>
+            <a:lvl5pPr marL="1371600" indent="0">
+              <a:buNone/>
+              <a:defRPr sz="1200" b="1"/>
             </a:lvl5pPr>
-            <a:lvl6pPr marL="2286000" indent="0">
-              <a:buNone/>
-              <a:defRPr sz="1600" b="1"/>
+            <a:lvl6pPr marL="1714500" indent="0">
+              <a:buNone/>
+              <a:defRPr sz="1200" b="1"/>
             </a:lvl6pPr>
-            <a:lvl7pPr marL="2743200" indent="0">
-              <a:buNone/>
-              <a:defRPr sz="1600" b="1"/>
+            <a:lvl7pPr marL="2057400" indent="0">
+              <a:buNone/>
+              <a:defRPr sz="1200" b="1"/>
             </a:lvl7pPr>
-            <a:lvl8pPr marL="3200400" indent="0">
-              <a:buNone/>
-              <a:defRPr sz="1600" b="1"/>
+            <a:lvl8pPr marL="2400300" indent="0">
+              <a:buNone/>
+              <a:defRPr sz="1200" b="1"/>
             </a:lvl8pPr>
-            <a:lvl9pPr marL="3657600" indent="0">
-              <a:buNone/>
-              <a:defRPr sz="1600" b="1"/>
+            <a:lvl9pPr marL="2743200" indent="0">
+              <a:buNone/>
+              <a:defRPr sz="1200" b="1"/>
             </a:lvl9pPr>
           </a:lstStyle>
           <a:p>
@@ -1727,13 +1536,7 @@
       </p:sp>
       <p:sp>
         <p:nvSpPr>
-          <p:cNvPr id="6" name="Inhaltsplatzhalter 5">
-            <a:extLst>
-              <a:ext uri="{FF2B5EF4-FFF2-40B4-BE49-F238E27FC236}">
-                <a16:creationId xmlns:a16="http://schemas.microsoft.com/office/drawing/2014/main" id="{B3B05FDF-3D72-1EBE-41B8-64D34B3024B7}"/>
-              </a:ext>
-            </a:extLst>
-          </p:cNvPr>
+          <p:cNvPr id="6" name="Content Placeholder 5"/>
           <p:cNvSpPr>
             <a:spLocks noGrp="1"/>
           </p:cNvSpPr>
@@ -1743,8 +1546,8 @@
         </p:nvSpPr>
         <p:spPr>
           <a:xfrm>
-            <a:off x="6172200" y="2505075"/>
-            <a:ext cx="5183188" cy="3684588"/>
+            <a:off x="4629150" y="1878806"/>
+            <a:ext cx="3887391" cy="2763441"/>
           </a:xfrm>
         </p:spPr>
         <p:txBody>
@@ -1784,18 +1587,13 @@
               <a:rPr lang="de-DE"/>
               <a:t>Fünfte Ebene</a:t>
             </a:r>
-          </a:p>
-        </p:txBody>
-      </p:sp>
-      <p:sp>
-        <p:nvSpPr>
-          <p:cNvPr id="7" name="Datumsplatzhalter 6">
-            <a:extLst>
-              <a:ext uri="{FF2B5EF4-FFF2-40B4-BE49-F238E27FC236}">
-                <a16:creationId xmlns:a16="http://schemas.microsoft.com/office/drawing/2014/main" id="{CCB3588E-CB29-F565-5F55-4368E708DC67}"/>
-              </a:ext>
-            </a:extLst>
-          </p:cNvPr>
+            <a:endParaRPr lang="en-US" dirty="0"/>
+          </a:p>
+        </p:txBody>
+      </p:sp>
+      <p:sp>
+        <p:nvSpPr>
+          <p:cNvPr id="7" name="Date Placeholder 6"/>
           <p:cNvSpPr>
             <a:spLocks noGrp="1"/>
           </p:cNvSpPr>
@@ -1810,7 +1608,7 @@
           <a:p>
             <a:fld id="{BF73B9A6-C276-4D0F-A316-0F89DCD331AD}" type="datetimeFigureOut">
               <a:rPr lang="de-DE" smtClean="0"/>
-              <a:t>29.09.2025</a:t>
+              <a:t>12.01.2026</a:t>
             </a:fld>
             <a:endParaRPr lang="de-DE"/>
           </a:p>
@@ -1818,13 +1616,7 @@
       </p:sp>
       <p:sp>
         <p:nvSpPr>
-          <p:cNvPr id="8" name="Fußzeilenplatzhalter 7">
-            <a:extLst>
-              <a:ext uri="{FF2B5EF4-FFF2-40B4-BE49-F238E27FC236}">
-                <a16:creationId xmlns:a16="http://schemas.microsoft.com/office/drawing/2014/main" id="{FD4BA1C6-17CB-2059-E1B0-4301BB5EFCDF}"/>
-              </a:ext>
-            </a:extLst>
-          </p:cNvPr>
+          <p:cNvPr id="8" name="Footer Placeholder 7"/>
           <p:cNvSpPr>
             <a:spLocks noGrp="1"/>
           </p:cNvSpPr>
@@ -1843,13 +1635,7 @@
       </p:sp>
       <p:sp>
         <p:nvSpPr>
-          <p:cNvPr id="9" name="Foliennummernplatzhalter 8">
-            <a:extLst>
-              <a:ext uri="{FF2B5EF4-FFF2-40B4-BE49-F238E27FC236}">
-                <a16:creationId xmlns:a16="http://schemas.microsoft.com/office/drawing/2014/main" id="{78ED9206-516B-3215-BAA1-7A2FB367ABD9}"/>
-              </a:ext>
-            </a:extLst>
-          </p:cNvPr>
+          <p:cNvPr id="9" name="Slide Number Placeholder 8"/>
           <p:cNvSpPr>
             <a:spLocks noGrp="1"/>
           </p:cNvSpPr>
@@ -1873,7 +1659,7 @@
     </p:spTree>
     <p:extLst>
       <p:ext uri="{BB962C8B-B14F-4D97-AF65-F5344CB8AC3E}">
-        <p14:creationId xmlns:p14="http://schemas.microsoft.com/office/powerpoint/2010/main" val="4229886597"/>
+        <p14:creationId xmlns:p14="http://schemas.microsoft.com/office/powerpoint/2010/main" val="2911496968"/>
       </p:ext>
     </p:extLst>
   </p:cSld>
@@ -1902,13 +1688,7 @@
       </p:grpSpPr>
       <p:sp>
         <p:nvSpPr>
-          <p:cNvPr id="2" name="Titel 1">
-            <a:extLst>
-              <a:ext uri="{FF2B5EF4-FFF2-40B4-BE49-F238E27FC236}">
-                <a16:creationId xmlns:a16="http://schemas.microsoft.com/office/drawing/2014/main" id="{6A1CC8C6-BAB6-C9C8-6119-7554A581F977}"/>
-              </a:ext>
-            </a:extLst>
-          </p:cNvPr>
+          <p:cNvPr id="2" name="Title 1"/>
           <p:cNvSpPr>
             <a:spLocks noGrp="1"/>
           </p:cNvSpPr>
@@ -1925,18 +1705,13 @@
               <a:rPr lang="de-DE"/>
               <a:t>Mastertitelformat bearbeiten</a:t>
             </a:r>
-          </a:p>
-        </p:txBody>
-      </p:sp>
-      <p:sp>
-        <p:nvSpPr>
-          <p:cNvPr id="3" name="Datumsplatzhalter 2">
-            <a:extLst>
-              <a:ext uri="{FF2B5EF4-FFF2-40B4-BE49-F238E27FC236}">
-                <a16:creationId xmlns:a16="http://schemas.microsoft.com/office/drawing/2014/main" id="{558A9BE6-56ED-AD55-AE94-A7FEE48E51D9}"/>
-              </a:ext>
-            </a:extLst>
-          </p:cNvPr>
+            <a:endParaRPr lang="en-US" dirty="0"/>
+          </a:p>
+        </p:txBody>
+      </p:sp>
+      <p:sp>
+        <p:nvSpPr>
+          <p:cNvPr id="3" name="Date Placeholder 2"/>
           <p:cNvSpPr>
             <a:spLocks noGrp="1"/>
           </p:cNvSpPr>
@@ -1951,7 +1726,7 @@
           <a:p>
             <a:fld id="{BF73B9A6-C276-4D0F-A316-0F89DCD331AD}" type="datetimeFigureOut">
               <a:rPr lang="de-DE" smtClean="0"/>
-              <a:t>29.09.2025</a:t>
+              <a:t>12.01.2026</a:t>
             </a:fld>
             <a:endParaRPr lang="de-DE"/>
           </a:p>
@@ -1959,13 +1734,7 @@
       </p:sp>
       <p:sp>
         <p:nvSpPr>
-          <p:cNvPr id="4" name="Fußzeilenplatzhalter 3">
-            <a:extLst>
-              <a:ext uri="{FF2B5EF4-FFF2-40B4-BE49-F238E27FC236}">
-                <a16:creationId xmlns:a16="http://schemas.microsoft.com/office/drawing/2014/main" id="{02179C2A-85A1-E556-09F1-15827242F25A}"/>
-              </a:ext>
-            </a:extLst>
-          </p:cNvPr>
+          <p:cNvPr id="4" name="Footer Placeholder 3"/>
           <p:cNvSpPr>
             <a:spLocks noGrp="1"/>
           </p:cNvSpPr>
@@ -1984,13 +1753,7 @@
       </p:sp>
       <p:sp>
         <p:nvSpPr>
-          <p:cNvPr id="5" name="Foliennummernplatzhalter 4">
-            <a:extLst>
-              <a:ext uri="{FF2B5EF4-FFF2-40B4-BE49-F238E27FC236}">
-                <a16:creationId xmlns:a16="http://schemas.microsoft.com/office/drawing/2014/main" id="{9453AE7C-3ADF-1719-1AFA-4AC783CD7C50}"/>
-              </a:ext>
-            </a:extLst>
-          </p:cNvPr>
+          <p:cNvPr id="5" name="Slide Number Placeholder 4"/>
           <p:cNvSpPr>
             <a:spLocks noGrp="1"/>
           </p:cNvSpPr>
@@ -2014,7 +1777,7 @@
     </p:spTree>
     <p:extLst>
       <p:ext uri="{BB962C8B-B14F-4D97-AF65-F5344CB8AC3E}">
-        <p14:creationId xmlns:p14="http://schemas.microsoft.com/office/powerpoint/2010/main" val="1398768139"/>
+        <p14:creationId xmlns:p14="http://schemas.microsoft.com/office/powerpoint/2010/main" val="1971033339"/>
       </p:ext>
     </p:extLst>
   </p:cSld>
@@ -2043,13 +1806,7 @@
       </p:grpSpPr>
       <p:sp>
         <p:nvSpPr>
-          <p:cNvPr id="2" name="Datumsplatzhalter 1">
-            <a:extLst>
-              <a:ext uri="{FF2B5EF4-FFF2-40B4-BE49-F238E27FC236}">
-                <a16:creationId xmlns:a16="http://schemas.microsoft.com/office/drawing/2014/main" id="{85145266-B683-E834-9D7C-B392DE854E26}"/>
-              </a:ext>
-            </a:extLst>
-          </p:cNvPr>
+          <p:cNvPr id="2" name="Date Placeholder 1"/>
           <p:cNvSpPr>
             <a:spLocks noGrp="1"/>
           </p:cNvSpPr>
@@ -2064,7 +1821,7 @@
           <a:p>
             <a:fld id="{BF73B9A6-C276-4D0F-A316-0F89DCD331AD}" type="datetimeFigureOut">
               <a:rPr lang="de-DE" smtClean="0"/>
-              <a:t>29.09.2025</a:t>
+              <a:t>12.01.2026</a:t>
             </a:fld>
             <a:endParaRPr lang="de-DE"/>
           </a:p>
@@ -2072,13 +1829,7 @@
       </p:sp>
       <p:sp>
         <p:nvSpPr>
-          <p:cNvPr id="3" name="Fußzeilenplatzhalter 2">
-            <a:extLst>
-              <a:ext uri="{FF2B5EF4-FFF2-40B4-BE49-F238E27FC236}">
-                <a16:creationId xmlns:a16="http://schemas.microsoft.com/office/drawing/2014/main" id="{EFEBEA14-0659-F933-AF68-8B94B08CB31E}"/>
-              </a:ext>
-            </a:extLst>
-          </p:cNvPr>
+          <p:cNvPr id="3" name="Footer Placeholder 2"/>
           <p:cNvSpPr>
             <a:spLocks noGrp="1"/>
           </p:cNvSpPr>
@@ -2097,13 +1848,7 @@
       </p:sp>
       <p:sp>
         <p:nvSpPr>
-          <p:cNvPr id="4" name="Foliennummernplatzhalter 3">
-            <a:extLst>
-              <a:ext uri="{FF2B5EF4-FFF2-40B4-BE49-F238E27FC236}">
-                <a16:creationId xmlns:a16="http://schemas.microsoft.com/office/drawing/2014/main" id="{74F21836-AE86-063B-7E59-7E9C78EC5DA2}"/>
-              </a:ext>
-            </a:extLst>
-          </p:cNvPr>
+          <p:cNvPr id="4" name="Slide Number Placeholder 3"/>
           <p:cNvSpPr>
             <a:spLocks noGrp="1"/>
           </p:cNvSpPr>
@@ -2127,7 +1872,7 @@
     </p:spTree>
     <p:extLst>
       <p:ext uri="{BB962C8B-B14F-4D97-AF65-F5344CB8AC3E}">
-        <p14:creationId xmlns:p14="http://schemas.microsoft.com/office/powerpoint/2010/main" val="1328082437"/>
+        <p14:creationId xmlns:p14="http://schemas.microsoft.com/office/powerpoint/2010/main" val="1584349961"/>
       </p:ext>
     </p:extLst>
   </p:cSld>
@@ -2156,13 +1901,7 @@
       </p:grpSpPr>
       <p:sp>
         <p:nvSpPr>
-          <p:cNvPr id="2" name="Titel 1">
-            <a:extLst>
-              <a:ext uri="{FF2B5EF4-FFF2-40B4-BE49-F238E27FC236}">
-                <a16:creationId xmlns:a16="http://schemas.microsoft.com/office/drawing/2014/main" id="{17B224D2-1B15-F694-46F3-023EAEA0FA7C}"/>
-              </a:ext>
-            </a:extLst>
-          </p:cNvPr>
+          <p:cNvPr id="2" name="Title 1"/>
           <p:cNvSpPr>
             <a:spLocks noGrp="1"/>
           </p:cNvSpPr>
@@ -2172,15 +1911,15 @@
         </p:nvSpPr>
         <p:spPr>
           <a:xfrm>
-            <a:off x="839788" y="457200"/>
-            <a:ext cx="3932237" cy="1600200"/>
+            <a:off x="629841" y="342900"/>
+            <a:ext cx="2949178" cy="1200150"/>
           </a:xfrm>
         </p:spPr>
         <p:txBody>
           <a:bodyPr anchor="b"/>
           <a:lstStyle>
             <a:lvl1pPr>
-              <a:defRPr sz="3200"/>
+              <a:defRPr sz="2400"/>
             </a:lvl1pPr>
           </a:lstStyle>
           <a:p>
@@ -2188,18 +1927,13 @@
               <a:rPr lang="de-DE"/>
               <a:t>Mastertitelformat bearbeiten</a:t>
             </a:r>
-          </a:p>
-        </p:txBody>
-      </p:sp>
-      <p:sp>
-        <p:nvSpPr>
-          <p:cNvPr id="3" name="Inhaltsplatzhalter 2">
-            <a:extLst>
-              <a:ext uri="{FF2B5EF4-FFF2-40B4-BE49-F238E27FC236}">
-                <a16:creationId xmlns:a16="http://schemas.microsoft.com/office/drawing/2014/main" id="{2FC3D52A-B0D7-8F63-7528-5E73F44656E7}"/>
-              </a:ext>
-            </a:extLst>
-          </p:cNvPr>
+            <a:endParaRPr lang="en-US" dirty="0"/>
+          </a:p>
+        </p:txBody>
+      </p:sp>
+      <p:sp>
+        <p:nvSpPr>
+          <p:cNvPr id="3" name="Content Placeholder 2"/>
           <p:cNvSpPr>
             <a:spLocks noGrp="1"/>
           </p:cNvSpPr>
@@ -2209,39 +1943,39 @@
         </p:nvSpPr>
         <p:spPr>
           <a:xfrm>
-            <a:off x="5183188" y="987425"/>
-            <a:ext cx="6172200" cy="4873625"/>
+            <a:off x="3887391" y="740569"/>
+            <a:ext cx="4629150" cy="3655219"/>
           </a:xfrm>
         </p:spPr>
         <p:txBody>
           <a:bodyPr/>
           <a:lstStyle>
             <a:lvl1pPr>
-              <a:defRPr sz="3200"/>
+              <a:defRPr sz="2400"/>
             </a:lvl1pPr>
             <a:lvl2pPr>
-              <a:defRPr sz="2800"/>
+              <a:defRPr sz="2100"/>
             </a:lvl2pPr>
             <a:lvl3pPr>
-              <a:defRPr sz="2400"/>
+              <a:defRPr sz="1800"/>
             </a:lvl3pPr>
             <a:lvl4pPr>
-              <a:defRPr sz="2000"/>
+              <a:defRPr sz="1500"/>
             </a:lvl4pPr>
             <a:lvl5pPr>
-              <a:defRPr sz="2000"/>
+              <a:defRPr sz="1500"/>
             </a:lvl5pPr>
             <a:lvl6pPr>
-              <a:defRPr sz="2000"/>
+              <a:defRPr sz="1500"/>
             </a:lvl6pPr>
             <a:lvl7pPr>
-              <a:defRPr sz="2000"/>
+              <a:defRPr sz="1500"/>
             </a:lvl7pPr>
             <a:lvl8pPr>
-              <a:defRPr sz="2000"/>
+              <a:defRPr sz="1500"/>
             </a:lvl8pPr>
             <a:lvl9pPr>
-              <a:defRPr sz="2000"/>
+              <a:defRPr sz="1500"/>
             </a:lvl9pPr>
           </a:lstStyle>
           <a:p>
@@ -2278,18 +2012,13 @@
               <a:rPr lang="de-DE"/>
               <a:t>Fünfte Ebene</a:t>
             </a:r>
-          </a:p>
-        </p:txBody>
-      </p:sp>
-      <p:sp>
-        <p:nvSpPr>
-          <p:cNvPr id="4" name="Textplatzhalter 3">
-            <a:extLst>
-              <a:ext uri="{FF2B5EF4-FFF2-40B4-BE49-F238E27FC236}">
-                <a16:creationId xmlns:a16="http://schemas.microsoft.com/office/drawing/2014/main" id="{ACEF24DC-4125-D4F5-8EEB-0C866C730E30}"/>
-              </a:ext>
-            </a:extLst>
-          </p:cNvPr>
+            <a:endParaRPr lang="en-US" dirty="0"/>
+          </a:p>
+        </p:txBody>
+      </p:sp>
+      <p:sp>
+        <p:nvSpPr>
+          <p:cNvPr id="4" name="Text Placeholder 3"/>
           <p:cNvSpPr>
             <a:spLocks noGrp="1"/>
           </p:cNvSpPr>
@@ -2299,8 +2028,8 @@
         </p:nvSpPr>
         <p:spPr>
           <a:xfrm>
-            <a:off x="839788" y="2057400"/>
-            <a:ext cx="3932237" cy="3811588"/>
+            <a:off x="629841" y="1543050"/>
+            <a:ext cx="2949178" cy="2858691"/>
           </a:xfrm>
         </p:spPr>
         <p:txBody>
@@ -2308,39 +2037,39 @@
           <a:lstStyle>
             <a:lvl1pPr marL="0" indent="0">
               <a:buNone/>
-              <a:defRPr sz="1600"/>
+              <a:defRPr sz="1200"/>
             </a:lvl1pPr>
-            <a:lvl2pPr marL="457200" indent="0">
-              <a:buNone/>
-              <a:defRPr sz="1400"/>
+            <a:lvl2pPr marL="342900" indent="0">
+              <a:buNone/>
+              <a:defRPr sz="1050"/>
             </a:lvl2pPr>
-            <a:lvl3pPr marL="914400" indent="0">
-              <a:buNone/>
-              <a:defRPr sz="1200"/>
+            <a:lvl3pPr marL="685800" indent="0">
+              <a:buNone/>
+              <a:defRPr sz="900"/>
             </a:lvl3pPr>
-            <a:lvl4pPr marL="1371600" indent="0">
-              <a:buNone/>
-              <a:defRPr sz="1000"/>
+            <a:lvl4pPr marL="1028700" indent="0">
+              <a:buNone/>
+              <a:defRPr sz="750"/>
             </a:lvl4pPr>
-            <a:lvl5pPr marL="1828800" indent="0">
-              <a:buNone/>
-              <a:defRPr sz="1000"/>
+            <a:lvl5pPr marL="1371600" indent="0">
+              <a:buNone/>
+              <a:defRPr sz="750"/>
             </a:lvl5pPr>
-            <a:lvl6pPr marL="2286000" indent="0">
-              <a:buNone/>
-              <a:defRPr sz="1000"/>
+            <a:lvl6pPr marL="1714500" indent="0">
+              <a:buNone/>
+              <a:defRPr sz="750"/>
             </a:lvl6pPr>
-            <a:lvl7pPr marL="2743200" indent="0">
-              <a:buNone/>
-              <a:defRPr sz="1000"/>
+            <a:lvl7pPr marL="2057400" indent="0">
+              <a:buNone/>
+              <a:defRPr sz="750"/>
             </a:lvl7pPr>
-            <a:lvl8pPr marL="3200400" indent="0">
-              <a:buNone/>
-              <a:defRPr sz="1000"/>
+            <a:lvl8pPr marL="2400300" indent="0">
+              <a:buNone/>
+              <a:defRPr sz="750"/>
             </a:lvl8pPr>
-            <a:lvl9pPr marL="3657600" indent="0">
-              <a:buNone/>
-              <a:defRPr sz="1000"/>
+            <a:lvl9pPr marL="2743200" indent="0">
+              <a:buNone/>
+              <a:defRPr sz="750"/>
             </a:lvl9pPr>
           </a:lstStyle>
           <a:p>
@@ -2354,13 +2083,7 @@
       </p:sp>
       <p:sp>
         <p:nvSpPr>
-          <p:cNvPr id="5" name="Datumsplatzhalter 4">
-            <a:extLst>
-              <a:ext uri="{FF2B5EF4-FFF2-40B4-BE49-F238E27FC236}">
-                <a16:creationId xmlns:a16="http://schemas.microsoft.com/office/drawing/2014/main" id="{E0D8D5AB-8BE6-152E-F40C-09A65E5D6067}"/>
-              </a:ext>
-            </a:extLst>
-          </p:cNvPr>
+          <p:cNvPr id="5" name="Date Placeholder 4"/>
           <p:cNvSpPr>
             <a:spLocks noGrp="1"/>
           </p:cNvSpPr>
@@ -2375,7 +2098,7 @@
           <a:p>
             <a:fld id="{BF73B9A6-C276-4D0F-A316-0F89DCD331AD}" type="datetimeFigureOut">
               <a:rPr lang="de-DE" smtClean="0"/>
-              <a:t>29.09.2025</a:t>
+              <a:t>12.01.2026</a:t>
             </a:fld>
             <a:endParaRPr lang="de-DE"/>
           </a:p>
@@ -2383,13 +2106,7 @@
       </p:sp>
       <p:sp>
         <p:nvSpPr>
-          <p:cNvPr id="6" name="Fußzeilenplatzhalter 5">
-            <a:extLst>
-              <a:ext uri="{FF2B5EF4-FFF2-40B4-BE49-F238E27FC236}">
-                <a16:creationId xmlns:a16="http://schemas.microsoft.com/office/drawing/2014/main" id="{57606E5B-BBB4-1960-DFD2-6B13C8C8F0DF}"/>
-              </a:ext>
-            </a:extLst>
-          </p:cNvPr>
+          <p:cNvPr id="6" name="Footer Placeholder 5"/>
           <p:cNvSpPr>
             <a:spLocks noGrp="1"/>
           </p:cNvSpPr>
@@ -2408,13 +2125,7 @@
       </p:sp>
       <p:sp>
         <p:nvSpPr>
-          <p:cNvPr id="7" name="Foliennummernplatzhalter 6">
-            <a:extLst>
-              <a:ext uri="{FF2B5EF4-FFF2-40B4-BE49-F238E27FC236}">
-                <a16:creationId xmlns:a16="http://schemas.microsoft.com/office/drawing/2014/main" id="{C9242C05-9F94-9351-92C3-68C3F6B683CC}"/>
-              </a:ext>
-            </a:extLst>
-          </p:cNvPr>
+          <p:cNvPr id="7" name="Slide Number Placeholder 6"/>
           <p:cNvSpPr>
             <a:spLocks noGrp="1"/>
           </p:cNvSpPr>
@@ -2438,7 +2149,7 @@
     </p:spTree>
     <p:extLst>
       <p:ext uri="{BB962C8B-B14F-4D97-AF65-F5344CB8AC3E}">
-        <p14:creationId xmlns:p14="http://schemas.microsoft.com/office/powerpoint/2010/main" val="1334780435"/>
+        <p14:creationId xmlns:p14="http://schemas.microsoft.com/office/powerpoint/2010/main" val="324088855"/>
       </p:ext>
     </p:extLst>
   </p:cSld>
@@ -2467,13 +2178,7 @@
       </p:grpSpPr>
       <p:sp>
         <p:nvSpPr>
-          <p:cNvPr id="2" name="Titel 1">
-            <a:extLst>
-              <a:ext uri="{FF2B5EF4-FFF2-40B4-BE49-F238E27FC236}">
-                <a16:creationId xmlns:a16="http://schemas.microsoft.com/office/drawing/2014/main" id="{54E215BD-4CAD-C467-7651-E72BD47F0347}"/>
-              </a:ext>
-            </a:extLst>
-          </p:cNvPr>
+          <p:cNvPr id="2" name="Title 1"/>
           <p:cNvSpPr>
             <a:spLocks noGrp="1"/>
           </p:cNvSpPr>
@@ -2483,15 +2188,15 @@
         </p:nvSpPr>
         <p:spPr>
           <a:xfrm>
-            <a:off x="839788" y="457200"/>
-            <a:ext cx="3932237" cy="1600200"/>
+            <a:off x="629841" y="342900"/>
+            <a:ext cx="2949178" cy="1200150"/>
           </a:xfrm>
         </p:spPr>
         <p:txBody>
           <a:bodyPr anchor="b"/>
           <a:lstStyle>
             <a:lvl1pPr>
-              <a:defRPr sz="3200"/>
+              <a:defRPr sz="2400"/>
             </a:lvl1pPr>
           </a:lstStyle>
           <a:p>
@@ -2499,20 +2204,15 @@
               <a:rPr lang="de-DE"/>
               <a:t>Mastertitelformat bearbeiten</a:t>
             </a:r>
-          </a:p>
-        </p:txBody>
-      </p:sp>
-      <p:sp>
-        <p:nvSpPr>
-          <p:cNvPr id="3" name="Bildplatzhalter 2">
-            <a:extLst>
-              <a:ext uri="{FF2B5EF4-FFF2-40B4-BE49-F238E27FC236}">
-                <a16:creationId xmlns:a16="http://schemas.microsoft.com/office/drawing/2014/main" id="{F69E2EB7-B47E-E137-059C-4BCADCE34A19}"/>
-              </a:ext>
-            </a:extLst>
-          </p:cNvPr>
-          <p:cNvSpPr>
-            <a:spLocks noGrp="1"/>
+            <a:endParaRPr lang="en-US" dirty="0"/>
+          </a:p>
+        </p:txBody>
+      </p:sp>
+      <p:sp>
+        <p:nvSpPr>
+          <p:cNvPr id="3" name="Picture Placeholder 2"/>
+          <p:cNvSpPr>
+            <a:spLocks noGrp="1" noChangeAspect="1"/>
           </p:cNvSpPr>
           <p:nvPr>
             <p:ph type="pic" idx="1"/>
@@ -2520,64 +2220,62 @@
         </p:nvSpPr>
         <p:spPr>
           <a:xfrm>
-            <a:off x="5183188" y="987425"/>
-            <a:ext cx="6172200" cy="4873625"/>
+            <a:off x="3887391" y="740569"/>
+            <a:ext cx="4629150" cy="3655219"/>
           </a:xfrm>
         </p:spPr>
         <p:txBody>
-          <a:bodyPr/>
+          <a:bodyPr anchor="t"/>
           <a:lstStyle>
             <a:lvl1pPr marL="0" indent="0">
               <a:buNone/>
-              <a:defRPr sz="3200"/>
+              <a:defRPr sz="2400"/>
             </a:lvl1pPr>
-            <a:lvl2pPr marL="457200" indent="0">
-              <a:buNone/>
-              <a:defRPr sz="2800"/>
+            <a:lvl2pPr marL="342900" indent="0">
+              <a:buNone/>
+              <a:defRPr sz="2100"/>
             </a:lvl2pPr>
-            <a:lvl3pPr marL="914400" indent="0">
-              <a:buNone/>
-              <a:defRPr sz="2400"/>
+            <a:lvl3pPr marL="685800" indent="0">
+              <a:buNone/>
+              <a:defRPr sz="1800"/>
             </a:lvl3pPr>
-            <a:lvl4pPr marL="1371600" indent="0">
-              <a:buNone/>
-              <a:defRPr sz="2000"/>
+            <a:lvl4pPr marL="1028700" indent="0">
+              <a:buNone/>
+              <a:defRPr sz="1500"/>
             </a:lvl4pPr>
-            <a:lvl5pPr marL="1828800" indent="0">
-              <a:buNone/>
-              <a:defRPr sz="2000"/>
+            <a:lvl5pPr marL="1371600" indent="0">
+              <a:buNone/>
+              <a:defRPr sz="1500"/>
             </a:lvl5pPr>
-            <a:lvl6pPr marL="2286000" indent="0">
-              <a:buNone/>
-              <a:defRPr sz="2000"/>
+            <a:lvl6pPr marL="1714500" indent="0">
+              <a:buNone/>
+              <a:defRPr sz="1500"/>
             </a:lvl6pPr>
-            <a:lvl7pPr marL="2743200" indent="0">
-              <a:buNone/>
-              <a:defRPr sz="2000"/>
+            <a:lvl7pPr marL="2057400" indent="0">
+              <a:buNone/>
+              <a:defRPr sz="1500"/>
             </a:lvl7pPr>
-            <a:lvl8pPr marL="3200400" indent="0">
-              <a:buNone/>
-              <a:defRPr sz="2000"/>
+            <a:lvl8pPr marL="2400300" indent="0">
+              <a:buNone/>
+              <a:defRPr sz="1500"/>
             </a:lvl8pPr>
-            <a:lvl9pPr marL="3657600" indent="0">
-              <a:buNone/>
-              <a:defRPr sz="2000"/>
+            <a:lvl9pPr marL="2743200" indent="0">
+              <a:buNone/>
+              <a:defRPr sz="1500"/>
             </a:lvl9pPr>
           </a:lstStyle>
           <a:p>
-            <a:endParaRPr lang="de-DE"/>
-          </a:p>
-        </p:txBody>
-      </p:sp>
-      <p:sp>
-        <p:nvSpPr>
-          <p:cNvPr id="4" name="Textplatzhalter 3">
-            <a:extLst>
-              <a:ext uri="{FF2B5EF4-FFF2-40B4-BE49-F238E27FC236}">
-                <a16:creationId xmlns:a16="http://schemas.microsoft.com/office/drawing/2014/main" id="{24B0CFC8-027F-1A26-E90D-38FF49B1FA46}"/>
-              </a:ext>
-            </a:extLst>
-          </p:cNvPr>
+            <a:r>
+              <a:rPr lang="de-DE"/>
+              <a:t>Bild durch Klicken auf Symbol hinzufügen</a:t>
+            </a:r>
+            <a:endParaRPr lang="en-US" dirty="0"/>
+          </a:p>
+        </p:txBody>
+      </p:sp>
+      <p:sp>
+        <p:nvSpPr>
+          <p:cNvPr id="4" name="Text Placeholder 3"/>
           <p:cNvSpPr>
             <a:spLocks noGrp="1"/>
           </p:cNvSpPr>
@@ -2587,8 +2285,8 @@
         </p:nvSpPr>
         <p:spPr>
           <a:xfrm>
-            <a:off x="839788" y="2057400"/>
-            <a:ext cx="3932237" cy="3811588"/>
+            <a:off x="629841" y="1543050"/>
+            <a:ext cx="2949178" cy="2858691"/>
           </a:xfrm>
         </p:spPr>
         <p:txBody>
@@ -2596,39 +2294,39 @@
           <a:lstStyle>
             <a:lvl1pPr marL="0" indent="0">
               <a:buNone/>
-              <a:defRPr sz="1600"/>
+              <a:defRPr sz="1200"/>
             </a:lvl1pPr>
-            <a:lvl2pPr marL="457200" indent="0">
-              <a:buNone/>
-              <a:defRPr sz="1400"/>
+            <a:lvl2pPr marL="342900" indent="0">
+              <a:buNone/>
+              <a:defRPr sz="1050"/>
             </a:lvl2pPr>
-            <a:lvl3pPr marL="914400" indent="0">
-              <a:buNone/>
-              <a:defRPr sz="1200"/>
+            <a:lvl3pPr marL="685800" indent="0">
+              <a:buNone/>
+              <a:defRPr sz="900"/>
             </a:lvl3pPr>
-            <a:lvl4pPr marL="1371600" indent="0">
-              <a:buNone/>
-              <a:defRPr sz="1000"/>
+            <a:lvl4pPr marL="1028700" indent="0">
+              <a:buNone/>
+              <a:defRPr sz="750"/>
             </a:lvl4pPr>
-            <a:lvl5pPr marL="1828800" indent="0">
-              <a:buNone/>
-              <a:defRPr sz="1000"/>
+            <a:lvl5pPr marL="1371600" indent="0">
+              <a:buNone/>
+              <a:defRPr sz="750"/>
             </a:lvl5pPr>
-            <a:lvl6pPr marL="2286000" indent="0">
-              <a:buNone/>
-              <a:defRPr sz="1000"/>
+            <a:lvl6pPr marL="1714500" indent="0">
+              <a:buNone/>
+              <a:defRPr sz="750"/>
             </a:lvl6pPr>
-            <a:lvl7pPr marL="2743200" indent="0">
-              <a:buNone/>
-              <a:defRPr sz="1000"/>
+            <a:lvl7pPr marL="2057400" indent="0">
+              <a:buNone/>
+              <a:defRPr sz="750"/>
             </a:lvl7pPr>
-            <a:lvl8pPr marL="3200400" indent="0">
-              <a:buNone/>
-              <a:defRPr sz="1000"/>
+            <a:lvl8pPr marL="2400300" indent="0">
+              <a:buNone/>
+              <a:defRPr sz="750"/>
             </a:lvl8pPr>
-            <a:lvl9pPr marL="3657600" indent="0">
-              <a:buNone/>
-              <a:defRPr sz="1000"/>
+            <a:lvl9pPr marL="2743200" indent="0">
+              <a:buNone/>
+              <a:defRPr sz="750"/>
             </a:lvl9pPr>
           </a:lstStyle>
           <a:p>
@@ -2642,13 +2340,7 @@
       </p:sp>
       <p:sp>
         <p:nvSpPr>
-          <p:cNvPr id="5" name="Datumsplatzhalter 4">
-            <a:extLst>
-              <a:ext uri="{FF2B5EF4-FFF2-40B4-BE49-F238E27FC236}">
-                <a16:creationId xmlns:a16="http://schemas.microsoft.com/office/drawing/2014/main" id="{7E1B7969-2667-19D8-A7A0-D623D830CA1F}"/>
-              </a:ext>
-            </a:extLst>
-          </p:cNvPr>
+          <p:cNvPr id="5" name="Date Placeholder 4"/>
           <p:cNvSpPr>
             <a:spLocks noGrp="1"/>
           </p:cNvSpPr>
@@ -2663,7 +2355,7 @@
           <a:p>
             <a:fld id="{BF73B9A6-C276-4D0F-A316-0F89DCD331AD}" type="datetimeFigureOut">
               <a:rPr lang="de-DE" smtClean="0"/>
-              <a:t>29.09.2025</a:t>
+              <a:t>12.01.2026</a:t>
             </a:fld>
             <a:endParaRPr lang="de-DE"/>
           </a:p>
@@ -2671,13 +2363,7 @@
       </p:sp>
       <p:sp>
         <p:nvSpPr>
-          <p:cNvPr id="6" name="Fußzeilenplatzhalter 5">
-            <a:extLst>
-              <a:ext uri="{FF2B5EF4-FFF2-40B4-BE49-F238E27FC236}">
-                <a16:creationId xmlns:a16="http://schemas.microsoft.com/office/drawing/2014/main" id="{40272CB7-8060-120C-DC7C-35CE1E92E70A}"/>
-              </a:ext>
-            </a:extLst>
-          </p:cNvPr>
+          <p:cNvPr id="6" name="Footer Placeholder 5"/>
           <p:cNvSpPr>
             <a:spLocks noGrp="1"/>
           </p:cNvSpPr>
@@ -2696,13 +2382,7 @@
       </p:sp>
       <p:sp>
         <p:nvSpPr>
-          <p:cNvPr id="7" name="Foliennummernplatzhalter 6">
-            <a:extLst>
-              <a:ext uri="{FF2B5EF4-FFF2-40B4-BE49-F238E27FC236}">
-                <a16:creationId xmlns:a16="http://schemas.microsoft.com/office/drawing/2014/main" id="{536175B2-0AF7-AB8F-ABDE-67C5349EABA1}"/>
-              </a:ext>
-            </a:extLst>
-          </p:cNvPr>
+          <p:cNvPr id="7" name="Slide Number Placeholder 6"/>
           <p:cNvSpPr>
             <a:spLocks noGrp="1"/>
           </p:cNvSpPr>
@@ -2726,7 +2406,7 @@
     </p:spTree>
     <p:extLst>
       <p:ext uri="{BB962C8B-B14F-4D97-AF65-F5344CB8AC3E}">
-        <p14:creationId xmlns:p14="http://schemas.microsoft.com/office/powerpoint/2010/main" val="266776697"/>
+        <p14:creationId xmlns:p14="http://schemas.microsoft.com/office/powerpoint/2010/main" val="506920615"/>
       </p:ext>
     </p:extLst>
   </p:cSld>
@@ -2760,13 +2440,7 @@
       </p:grpSpPr>
       <p:sp>
         <p:nvSpPr>
-          <p:cNvPr id="2" name="Titelplatzhalter 1">
-            <a:extLst>
-              <a:ext uri="{FF2B5EF4-FFF2-40B4-BE49-F238E27FC236}">
-                <a16:creationId xmlns:a16="http://schemas.microsoft.com/office/drawing/2014/main" id="{F57EF557-E797-62D1-B43E-59D8FDA7F4B7}"/>
-              </a:ext>
-            </a:extLst>
-          </p:cNvPr>
+          <p:cNvPr id="2" name="Title Placeholder 1"/>
           <p:cNvSpPr>
             <a:spLocks noGrp="1"/>
           </p:cNvSpPr>
@@ -2776,8 +2450,8 @@
         </p:nvSpPr>
         <p:spPr>
           <a:xfrm>
-            <a:off x="838200" y="365125"/>
-            <a:ext cx="10515600" cy="1325563"/>
+            <a:off x="628650" y="273844"/>
+            <a:ext cx="7886700" cy="994172"/>
           </a:xfrm>
           <a:prstGeom prst="rect">
             <a:avLst/>
@@ -2793,18 +2467,13 @@
               <a:rPr lang="de-DE"/>
               <a:t>Mastertitelformat bearbeiten</a:t>
             </a:r>
-          </a:p>
-        </p:txBody>
-      </p:sp>
-      <p:sp>
-        <p:nvSpPr>
-          <p:cNvPr id="3" name="Textplatzhalter 2">
-            <a:extLst>
-              <a:ext uri="{FF2B5EF4-FFF2-40B4-BE49-F238E27FC236}">
-                <a16:creationId xmlns:a16="http://schemas.microsoft.com/office/drawing/2014/main" id="{CA59DB0E-2197-677F-3A00-D21965500CAB}"/>
-              </a:ext>
-            </a:extLst>
-          </p:cNvPr>
+            <a:endParaRPr lang="en-US" dirty="0"/>
+          </a:p>
+        </p:txBody>
+      </p:sp>
+      <p:sp>
+        <p:nvSpPr>
+          <p:cNvPr id="3" name="Text Placeholder 2"/>
           <p:cNvSpPr>
             <a:spLocks noGrp="1"/>
           </p:cNvSpPr>
@@ -2814,8 +2483,8 @@
         </p:nvSpPr>
         <p:spPr>
           <a:xfrm>
-            <a:off x="838200" y="1825625"/>
-            <a:ext cx="10515600" cy="4351338"/>
+            <a:off x="628650" y="1369219"/>
+            <a:ext cx="7886700" cy="3263504"/>
           </a:xfrm>
           <a:prstGeom prst="rect">
             <a:avLst/>
@@ -2860,18 +2529,13 @@
               <a:rPr lang="de-DE"/>
               <a:t>Fünfte Ebene</a:t>
             </a:r>
-          </a:p>
-        </p:txBody>
-      </p:sp>
-      <p:sp>
-        <p:nvSpPr>
-          <p:cNvPr id="4" name="Datumsplatzhalter 3">
-            <a:extLst>
-              <a:ext uri="{FF2B5EF4-FFF2-40B4-BE49-F238E27FC236}">
-                <a16:creationId xmlns:a16="http://schemas.microsoft.com/office/drawing/2014/main" id="{F3F0E699-90CC-DAA5-24EE-B3DC04ADEDAE}"/>
-              </a:ext>
-            </a:extLst>
-          </p:cNvPr>
+            <a:endParaRPr lang="en-US" dirty="0"/>
+          </a:p>
+        </p:txBody>
+      </p:sp>
+      <p:sp>
+        <p:nvSpPr>
+          <p:cNvPr id="4" name="Date Placeholder 3"/>
           <p:cNvSpPr>
             <a:spLocks noGrp="1"/>
           </p:cNvSpPr>
@@ -2881,8 +2545,8 @@
         </p:nvSpPr>
         <p:spPr>
           <a:xfrm>
-            <a:off x="838200" y="6356350"/>
-            <a:ext cx="2743200" cy="365125"/>
+            <a:off x="628650" y="4767263"/>
+            <a:ext cx="2057400" cy="273844"/>
           </a:xfrm>
           <a:prstGeom prst="rect">
             <a:avLst/>
@@ -2892,7 +2556,7 @@
           <a:bodyPr vert="horz" lIns="91440" tIns="45720" rIns="91440" bIns="45720" rtlCol="0" anchor="ctr"/>
           <a:lstStyle>
             <a:lvl1pPr algn="l">
-              <a:defRPr sz="1200">
+              <a:defRPr sz="900">
                 <a:solidFill>
                   <a:schemeClr val="tx1">
                     <a:tint val="82000"/>
@@ -2904,7 +2568,7 @@
           <a:p>
             <a:fld id="{BF73B9A6-C276-4D0F-A316-0F89DCD331AD}" type="datetimeFigureOut">
               <a:rPr lang="de-DE" smtClean="0"/>
-              <a:t>29.09.2025</a:t>
+              <a:t>12.01.2026</a:t>
             </a:fld>
             <a:endParaRPr lang="de-DE"/>
           </a:p>
@@ -2912,13 +2576,7 @@
       </p:sp>
       <p:sp>
         <p:nvSpPr>
-          <p:cNvPr id="5" name="Fußzeilenplatzhalter 4">
-            <a:extLst>
-              <a:ext uri="{FF2B5EF4-FFF2-40B4-BE49-F238E27FC236}">
-                <a16:creationId xmlns:a16="http://schemas.microsoft.com/office/drawing/2014/main" id="{48EAB9A1-2C62-7BAE-6677-8F188BBA389C}"/>
-              </a:ext>
-            </a:extLst>
-          </p:cNvPr>
+          <p:cNvPr id="5" name="Footer Placeholder 4"/>
           <p:cNvSpPr>
             <a:spLocks noGrp="1"/>
           </p:cNvSpPr>
@@ -2928,8 +2586,8 @@
         </p:nvSpPr>
         <p:spPr>
           <a:xfrm>
-            <a:off x="4038600" y="6356350"/>
-            <a:ext cx="4114800" cy="365125"/>
+            <a:off x="3028950" y="4767263"/>
+            <a:ext cx="3086100" cy="273844"/>
           </a:xfrm>
           <a:prstGeom prst="rect">
             <a:avLst/>
@@ -2939,7 +2597,7 @@
           <a:bodyPr vert="horz" lIns="91440" tIns="45720" rIns="91440" bIns="45720" rtlCol="0" anchor="ctr"/>
           <a:lstStyle>
             <a:lvl1pPr algn="ctr">
-              <a:defRPr sz="1200">
+              <a:defRPr sz="900">
                 <a:solidFill>
                   <a:schemeClr val="tx1">
                     <a:tint val="82000"/>
@@ -2955,13 +2613,7 @@
       </p:sp>
       <p:sp>
         <p:nvSpPr>
-          <p:cNvPr id="6" name="Foliennummernplatzhalter 5">
-            <a:extLst>
-              <a:ext uri="{FF2B5EF4-FFF2-40B4-BE49-F238E27FC236}">
-                <a16:creationId xmlns:a16="http://schemas.microsoft.com/office/drawing/2014/main" id="{00A123DD-044B-FED3-2616-8F174E38F929}"/>
-              </a:ext>
-            </a:extLst>
-          </p:cNvPr>
+          <p:cNvPr id="6" name="Slide Number Placeholder 5"/>
           <p:cNvSpPr>
             <a:spLocks noGrp="1"/>
           </p:cNvSpPr>
@@ -2971,8 +2623,8 @@
         </p:nvSpPr>
         <p:spPr>
           <a:xfrm>
-            <a:off x="8610600" y="6356350"/>
-            <a:ext cx="2743200" cy="365125"/>
+            <a:off x="6457950" y="4767263"/>
+            <a:ext cx="2057400" cy="273844"/>
           </a:xfrm>
           <a:prstGeom prst="rect">
             <a:avLst/>
@@ -2982,7 +2634,7 @@
           <a:bodyPr vert="horz" lIns="91440" tIns="45720" rIns="91440" bIns="45720" rtlCol="0" anchor="ctr"/>
           <a:lstStyle>
             <a:lvl1pPr algn="r">
-              <a:defRPr sz="1200">
+              <a:defRPr sz="900">
                 <a:solidFill>
                   <a:schemeClr val="tx1">
                     <a:tint val="82000"/>
@@ -3003,27 +2655,27 @@
     </p:spTree>
     <p:extLst>
       <p:ext uri="{BB962C8B-B14F-4D97-AF65-F5344CB8AC3E}">
-        <p14:creationId xmlns:p14="http://schemas.microsoft.com/office/powerpoint/2010/main" val="2041543485"/>
+        <p14:creationId xmlns:p14="http://schemas.microsoft.com/office/powerpoint/2010/main" val="3746031527"/>
       </p:ext>
     </p:extLst>
   </p:cSld>
   <p:clrMap bg1="lt1" tx1="dk1" bg2="lt2" tx2="dk2" accent1="accent1" accent2="accent2" accent3="accent3" accent4="accent4" accent5="accent5" accent6="accent6" hlink="hlink" folHlink="folHlink"/>
   <p:sldLayoutIdLst>
-    <p:sldLayoutId id="2147483649" r:id="rId1"/>
-    <p:sldLayoutId id="2147483650" r:id="rId2"/>
-    <p:sldLayoutId id="2147483651" r:id="rId3"/>
-    <p:sldLayoutId id="2147483652" r:id="rId4"/>
-    <p:sldLayoutId id="2147483653" r:id="rId5"/>
-    <p:sldLayoutId id="2147483654" r:id="rId6"/>
-    <p:sldLayoutId id="2147483655" r:id="rId7"/>
-    <p:sldLayoutId id="2147483656" r:id="rId8"/>
-    <p:sldLayoutId id="2147483657" r:id="rId9"/>
-    <p:sldLayoutId id="2147483658" r:id="rId10"/>
-    <p:sldLayoutId id="2147483659" r:id="rId11"/>
+    <p:sldLayoutId id="2147483661" r:id="rId1"/>
+    <p:sldLayoutId id="2147483662" r:id="rId2"/>
+    <p:sldLayoutId id="2147483663" r:id="rId3"/>
+    <p:sldLayoutId id="2147483664" r:id="rId4"/>
+    <p:sldLayoutId id="2147483665" r:id="rId5"/>
+    <p:sldLayoutId id="2147483666" r:id="rId6"/>
+    <p:sldLayoutId id="2147483667" r:id="rId7"/>
+    <p:sldLayoutId id="2147483668" r:id="rId8"/>
+    <p:sldLayoutId id="2147483669" r:id="rId9"/>
+    <p:sldLayoutId id="2147483670" r:id="rId10"/>
+    <p:sldLayoutId id="2147483671" r:id="rId11"/>
   </p:sldLayoutIdLst>
   <p:txStyles>
     <p:titleStyle>
-      <a:lvl1pPr algn="l" defTabSz="914400" rtl="0" eaLnBrk="1" latinLnBrk="0" hangingPunct="1">
+      <a:lvl1pPr algn="l" defTabSz="685800" rtl="0" eaLnBrk="1" latinLnBrk="0" hangingPunct="1">
         <a:lnSpc>
           <a:spcPct val="90000"/>
         </a:lnSpc>
@@ -3031,7 +2683,7 @@
           <a:spcPct val="0"/>
         </a:spcBef>
         <a:buNone/>
-        <a:defRPr sz="4400" kern="1200">
+        <a:defRPr sz="3300" kern="1200">
           <a:solidFill>
             <a:schemeClr val="tx1"/>
           </a:solidFill>
@@ -3042,16 +2694,16 @@
       </a:lvl1pPr>
     </p:titleStyle>
     <p:bodyStyle>
-      <a:lvl1pPr marL="228600" indent="-228600" algn="l" defTabSz="914400" rtl="0" eaLnBrk="1" latinLnBrk="0" hangingPunct="1">
+      <a:lvl1pPr marL="171450" indent="-171450" algn="l" defTabSz="685800" rtl="0" eaLnBrk="1" latinLnBrk="0" hangingPunct="1">
         <a:lnSpc>
           <a:spcPct val="90000"/>
         </a:lnSpc>
         <a:spcBef>
-          <a:spcPts val="1000"/>
+          <a:spcPts val="750"/>
         </a:spcBef>
         <a:buFont typeface="Arial" panose="020B0604020202020204" pitchFamily="34" charset="0"/>
         <a:buChar char="•"/>
-        <a:defRPr sz="2800" kern="1200">
+        <a:defRPr sz="2100" kern="1200">
           <a:solidFill>
             <a:schemeClr val="tx1"/>
           </a:solidFill>
@@ -3060,48 +2712,12 @@
           <a:cs typeface="+mn-cs"/>
         </a:defRPr>
       </a:lvl1pPr>
-      <a:lvl2pPr marL="685800" indent="-228600" algn="l" defTabSz="914400" rtl="0" eaLnBrk="1" latinLnBrk="0" hangingPunct="1">
+      <a:lvl2pPr marL="514350" indent="-171450" algn="l" defTabSz="685800" rtl="0" eaLnBrk="1" latinLnBrk="0" hangingPunct="1">
         <a:lnSpc>
           <a:spcPct val="90000"/>
         </a:lnSpc>
         <a:spcBef>
-          <a:spcPts val="500"/>
-        </a:spcBef>
-        <a:buFont typeface="Arial" panose="020B0604020202020204" pitchFamily="34" charset="0"/>
-        <a:buChar char="•"/>
-        <a:defRPr sz="2400" kern="1200">
-          <a:solidFill>
-            <a:schemeClr val="tx1"/>
-          </a:solidFill>
-          <a:latin typeface="+mn-lt"/>
-          <a:ea typeface="+mn-ea"/>
-          <a:cs typeface="+mn-cs"/>
-        </a:defRPr>
-      </a:lvl2pPr>
-      <a:lvl3pPr marL="1143000" indent="-228600" algn="l" defTabSz="914400" rtl="0" eaLnBrk="1" latinLnBrk="0" hangingPunct="1">
-        <a:lnSpc>
-          <a:spcPct val="90000"/>
-        </a:lnSpc>
-        <a:spcBef>
-          <a:spcPts val="500"/>
-        </a:spcBef>
-        <a:buFont typeface="Arial" panose="020B0604020202020204" pitchFamily="34" charset="0"/>
-        <a:buChar char="•"/>
-        <a:defRPr sz="2000" kern="1200">
-          <a:solidFill>
-            <a:schemeClr val="tx1"/>
-          </a:solidFill>
-          <a:latin typeface="+mn-lt"/>
-          <a:ea typeface="+mn-ea"/>
-          <a:cs typeface="+mn-cs"/>
-        </a:defRPr>
-      </a:lvl3pPr>
-      <a:lvl4pPr marL="1600200" indent="-228600" algn="l" defTabSz="914400" rtl="0" eaLnBrk="1" latinLnBrk="0" hangingPunct="1">
-        <a:lnSpc>
-          <a:spcPct val="90000"/>
-        </a:lnSpc>
-        <a:spcBef>
-          <a:spcPts val="500"/>
+          <a:spcPts val="375"/>
         </a:spcBef>
         <a:buFont typeface="Arial" panose="020B0604020202020204" pitchFamily="34" charset="0"/>
         <a:buChar char="•"/>
@@ -3113,17 +2729,53 @@
           <a:ea typeface="+mn-ea"/>
           <a:cs typeface="+mn-cs"/>
         </a:defRPr>
-      </a:lvl4pPr>
-      <a:lvl5pPr marL="2057400" indent="-228600" algn="l" defTabSz="914400" rtl="0" eaLnBrk="1" latinLnBrk="0" hangingPunct="1">
+      </a:lvl2pPr>
+      <a:lvl3pPr marL="857250" indent="-171450" algn="l" defTabSz="685800" rtl="0" eaLnBrk="1" latinLnBrk="0" hangingPunct="1">
         <a:lnSpc>
           <a:spcPct val="90000"/>
         </a:lnSpc>
         <a:spcBef>
-          <a:spcPts val="500"/>
+          <a:spcPts val="375"/>
         </a:spcBef>
         <a:buFont typeface="Arial" panose="020B0604020202020204" pitchFamily="34" charset="0"/>
         <a:buChar char="•"/>
-        <a:defRPr sz="1800" kern="1200">
+        <a:defRPr sz="1500" kern="1200">
+          <a:solidFill>
+            <a:schemeClr val="tx1"/>
+          </a:solidFill>
+          <a:latin typeface="+mn-lt"/>
+          <a:ea typeface="+mn-ea"/>
+          <a:cs typeface="+mn-cs"/>
+        </a:defRPr>
+      </a:lvl3pPr>
+      <a:lvl4pPr marL="1200150" indent="-171450" algn="l" defTabSz="685800" rtl="0" eaLnBrk="1" latinLnBrk="0" hangingPunct="1">
+        <a:lnSpc>
+          <a:spcPct val="90000"/>
+        </a:lnSpc>
+        <a:spcBef>
+          <a:spcPts val="375"/>
+        </a:spcBef>
+        <a:buFont typeface="Arial" panose="020B0604020202020204" pitchFamily="34" charset="0"/>
+        <a:buChar char="•"/>
+        <a:defRPr sz="1350" kern="1200">
+          <a:solidFill>
+            <a:schemeClr val="tx1"/>
+          </a:solidFill>
+          <a:latin typeface="+mn-lt"/>
+          <a:ea typeface="+mn-ea"/>
+          <a:cs typeface="+mn-cs"/>
+        </a:defRPr>
+      </a:lvl4pPr>
+      <a:lvl5pPr marL="1543050" indent="-171450" algn="l" defTabSz="685800" rtl="0" eaLnBrk="1" latinLnBrk="0" hangingPunct="1">
+        <a:lnSpc>
+          <a:spcPct val="90000"/>
+        </a:lnSpc>
+        <a:spcBef>
+          <a:spcPts val="375"/>
+        </a:spcBef>
+        <a:buFont typeface="Arial" panose="020B0604020202020204" pitchFamily="34" charset="0"/>
+        <a:buChar char="•"/>
+        <a:defRPr sz="1350" kern="1200">
           <a:solidFill>
             <a:schemeClr val="tx1"/>
           </a:solidFill>
@@ -3132,16 +2784,16 @@
           <a:cs typeface="+mn-cs"/>
         </a:defRPr>
       </a:lvl5pPr>
-      <a:lvl6pPr marL="2514600" indent="-228600" algn="l" defTabSz="914400" rtl="0" eaLnBrk="1" latinLnBrk="0" hangingPunct="1">
+      <a:lvl6pPr marL="1885950" indent="-171450" algn="l" defTabSz="685800" rtl="0" eaLnBrk="1" latinLnBrk="0" hangingPunct="1">
         <a:lnSpc>
           <a:spcPct val="90000"/>
         </a:lnSpc>
         <a:spcBef>
-          <a:spcPts val="500"/>
+          <a:spcPts val="375"/>
         </a:spcBef>
         <a:buFont typeface="Arial" panose="020B0604020202020204" pitchFamily="34" charset="0"/>
         <a:buChar char="•"/>
-        <a:defRPr sz="1800" kern="1200">
+        <a:defRPr sz="1350" kern="1200">
           <a:solidFill>
             <a:schemeClr val="tx1"/>
           </a:solidFill>
@@ -3150,16 +2802,16 @@
           <a:cs typeface="+mn-cs"/>
         </a:defRPr>
       </a:lvl6pPr>
-      <a:lvl7pPr marL="2971800" indent="-228600" algn="l" defTabSz="914400" rtl="0" eaLnBrk="1" latinLnBrk="0" hangingPunct="1">
+      <a:lvl7pPr marL="2228850" indent="-171450" algn="l" defTabSz="685800" rtl="0" eaLnBrk="1" latinLnBrk="0" hangingPunct="1">
         <a:lnSpc>
           <a:spcPct val="90000"/>
         </a:lnSpc>
         <a:spcBef>
-          <a:spcPts val="500"/>
+          <a:spcPts val="375"/>
         </a:spcBef>
         <a:buFont typeface="Arial" panose="020B0604020202020204" pitchFamily="34" charset="0"/>
         <a:buChar char="•"/>
-        <a:defRPr sz="1800" kern="1200">
+        <a:defRPr sz="1350" kern="1200">
           <a:solidFill>
             <a:schemeClr val="tx1"/>
           </a:solidFill>
@@ -3168,16 +2820,16 @@
           <a:cs typeface="+mn-cs"/>
         </a:defRPr>
       </a:lvl7pPr>
-      <a:lvl8pPr marL="3429000" indent="-228600" algn="l" defTabSz="914400" rtl="0" eaLnBrk="1" latinLnBrk="0" hangingPunct="1">
+      <a:lvl8pPr marL="2571750" indent="-171450" algn="l" defTabSz="685800" rtl="0" eaLnBrk="1" latinLnBrk="0" hangingPunct="1">
         <a:lnSpc>
           <a:spcPct val="90000"/>
         </a:lnSpc>
         <a:spcBef>
-          <a:spcPts val="500"/>
+          <a:spcPts val="375"/>
         </a:spcBef>
         <a:buFont typeface="Arial" panose="020B0604020202020204" pitchFamily="34" charset="0"/>
         <a:buChar char="•"/>
-        <a:defRPr sz="1800" kern="1200">
+        <a:defRPr sz="1350" kern="1200">
           <a:solidFill>
             <a:schemeClr val="tx1"/>
           </a:solidFill>
@@ -3186,16 +2838,16 @@
           <a:cs typeface="+mn-cs"/>
         </a:defRPr>
       </a:lvl8pPr>
-      <a:lvl9pPr marL="3886200" indent="-228600" algn="l" defTabSz="914400" rtl="0" eaLnBrk="1" latinLnBrk="0" hangingPunct="1">
+      <a:lvl9pPr marL="2914650" indent="-171450" algn="l" defTabSz="685800" rtl="0" eaLnBrk="1" latinLnBrk="0" hangingPunct="1">
         <a:lnSpc>
           <a:spcPct val="90000"/>
         </a:lnSpc>
         <a:spcBef>
-          <a:spcPts val="500"/>
+          <a:spcPts val="375"/>
         </a:spcBef>
         <a:buFont typeface="Arial" panose="020B0604020202020204" pitchFamily="34" charset="0"/>
         <a:buChar char="•"/>
-        <a:defRPr sz="1800" kern="1200">
+        <a:defRPr sz="1350" kern="1200">
           <a:solidFill>
             <a:schemeClr val="tx1"/>
           </a:solidFill>
@@ -3207,10 +2859,10 @@
     </p:bodyStyle>
     <p:otherStyle>
       <a:defPPr>
-        <a:defRPr lang="de-DE"/>
+        <a:defRPr lang="en-US"/>
       </a:defPPr>
-      <a:lvl1pPr marL="0" algn="l" defTabSz="914400" rtl="0" eaLnBrk="1" latinLnBrk="0" hangingPunct="1">
-        <a:defRPr sz="1800" kern="1200">
+      <a:lvl1pPr marL="0" algn="l" defTabSz="685800" rtl="0" eaLnBrk="1" latinLnBrk="0" hangingPunct="1">
+        <a:defRPr sz="1350" kern="1200">
           <a:solidFill>
             <a:schemeClr val="tx1"/>
           </a:solidFill>
@@ -3219,8 +2871,8 @@
           <a:cs typeface="+mn-cs"/>
         </a:defRPr>
       </a:lvl1pPr>
-      <a:lvl2pPr marL="457200" algn="l" defTabSz="914400" rtl="0" eaLnBrk="1" latinLnBrk="0" hangingPunct="1">
-        <a:defRPr sz="1800" kern="1200">
+      <a:lvl2pPr marL="342900" algn="l" defTabSz="685800" rtl="0" eaLnBrk="1" latinLnBrk="0" hangingPunct="1">
+        <a:defRPr sz="1350" kern="1200">
           <a:solidFill>
             <a:schemeClr val="tx1"/>
           </a:solidFill>
@@ -3229,8 +2881,8 @@
           <a:cs typeface="+mn-cs"/>
         </a:defRPr>
       </a:lvl2pPr>
-      <a:lvl3pPr marL="914400" algn="l" defTabSz="914400" rtl="0" eaLnBrk="1" latinLnBrk="0" hangingPunct="1">
-        <a:defRPr sz="1800" kern="1200">
+      <a:lvl3pPr marL="685800" algn="l" defTabSz="685800" rtl="0" eaLnBrk="1" latinLnBrk="0" hangingPunct="1">
+        <a:defRPr sz="1350" kern="1200">
           <a:solidFill>
             <a:schemeClr val="tx1"/>
           </a:solidFill>
@@ -3239,8 +2891,8 @@
           <a:cs typeface="+mn-cs"/>
         </a:defRPr>
       </a:lvl3pPr>
-      <a:lvl4pPr marL="1371600" algn="l" defTabSz="914400" rtl="0" eaLnBrk="1" latinLnBrk="0" hangingPunct="1">
-        <a:defRPr sz="1800" kern="1200">
+      <a:lvl4pPr marL="1028700" algn="l" defTabSz="685800" rtl="0" eaLnBrk="1" latinLnBrk="0" hangingPunct="1">
+        <a:defRPr sz="1350" kern="1200">
           <a:solidFill>
             <a:schemeClr val="tx1"/>
           </a:solidFill>
@@ -3249,8 +2901,8 @@
           <a:cs typeface="+mn-cs"/>
         </a:defRPr>
       </a:lvl4pPr>
-      <a:lvl5pPr marL="1828800" algn="l" defTabSz="914400" rtl="0" eaLnBrk="1" latinLnBrk="0" hangingPunct="1">
-        <a:defRPr sz="1800" kern="1200">
+      <a:lvl5pPr marL="1371600" algn="l" defTabSz="685800" rtl="0" eaLnBrk="1" latinLnBrk="0" hangingPunct="1">
+        <a:defRPr sz="1350" kern="1200">
           <a:solidFill>
             <a:schemeClr val="tx1"/>
           </a:solidFill>
@@ -3259,8 +2911,8 @@
           <a:cs typeface="+mn-cs"/>
         </a:defRPr>
       </a:lvl5pPr>
-      <a:lvl6pPr marL="2286000" algn="l" defTabSz="914400" rtl="0" eaLnBrk="1" latinLnBrk="0" hangingPunct="1">
-        <a:defRPr sz="1800" kern="1200">
+      <a:lvl6pPr marL="1714500" algn="l" defTabSz="685800" rtl="0" eaLnBrk="1" latinLnBrk="0" hangingPunct="1">
+        <a:defRPr sz="1350" kern="1200">
           <a:solidFill>
             <a:schemeClr val="tx1"/>
           </a:solidFill>
@@ -3269,8 +2921,8 @@
           <a:cs typeface="+mn-cs"/>
         </a:defRPr>
       </a:lvl6pPr>
-      <a:lvl7pPr marL="2743200" algn="l" defTabSz="914400" rtl="0" eaLnBrk="1" latinLnBrk="0" hangingPunct="1">
-        <a:defRPr sz="1800" kern="1200">
+      <a:lvl7pPr marL="2057400" algn="l" defTabSz="685800" rtl="0" eaLnBrk="1" latinLnBrk="0" hangingPunct="1">
+        <a:defRPr sz="1350" kern="1200">
           <a:solidFill>
             <a:schemeClr val="tx1"/>
           </a:solidFill>
@@ -3279,8 +2931,8 @@
           <a:cs typeface="+mn-cs"/>
         </a:defRPr>
       </a:lvl7pPr>
-      <a:lvl8pPr marL="3200400" algn="l" defTabSz="914400" rtl="0" eaLnBrk="1" latinLnBrk="0" hangingPunct="1">
-        <a:defRPr sz="1800" kern="1200">
+      <a:lvl8pPr marL="2400300" algn="l" defTabSz="685800" rtl="0" eaLnBrk="1" latinLnBrk="0" hangingPunct="1">
+        <a:defRPr sz="1350" kern="1200">
           <a:solidFill>
             <a:schemeClr val="tx1"/>
           </a:solidFill>
@@ -3289,8 +2941,8 @@
           <a:cs typeface="+mn-cs"/>
         </a:defRPr>
       </a:lvl8pPr>
-      <a:lvl9pPr marL="3657600" algn="l" defTabSz="914400" rtl="0" eaLnBrk="1" latinLnBrk="0" hangingPunct="1">
-        <a:defRPr sz="1800" kern="1200">
+      <a:lvl9pPr marL="2743200" algn="l" defTabSz="685800" rtl="0" eaLnBrk="1" latinLnBrk="0" hangingPunct="1">
+        <a:defRPr sz="1350" kern="1200">
           <a:solidFill>
             <a:schemeClr val="tx1"/>
           </a:solidFill>
@@ -3335,8 +2987,8 @@
         </p:nvSpPr>
         <p:spPr>
           <a:xfrm>
-            <a:off x="-15600" y="0"/>
-            <a:ext cx="12207600" cy="1140643"/>
+            <a:off x="-11700" y="1"/>
+            <a:ext cx="9155700" cy="855482"/>
           </a:xfrm>
           <a:prstGeom prst="rect">
             <a:avLst/>
@@ -3373,7 +3025,7 @@
           <a:lstStyle/>
           <a:p>
             <a:pPr algn="ctr"/>
-            <a:endParaRPr lang="de-DE"/>
+            <a:endParaRPr lang="de-DE" sz="1013"/>
           </a:p>
         </p:txBody>
       </p:sp>
@@ -3393,10 +3045,10 @@
         </p:nvGrpSpPr>
         <p:grpSpPr>
           <a:xfrm>
-            <a:off x="-15600" y="5109326"/>
-            <a:ext cx="12226454" cy="1758101"/>
+            <a:off x="-11700" y="3831995"/>
+            <a:ext cx="9169841" cy="1341660"/>
             <a:chOff x="-15600" y="5109326"/>
-            <a:chExt cx="12226454" cy="1758101"/>
+            <a:chExt cx="12226454" cy="1788879"/>
           </a:xfrm>
         </p:grpSpPr>
         <p:sp>
@@ -3453,7 +3105,7 @@
             <a:lstStyle/>
             <a:p>
               <a:pPr algn="ctr"/>
-              <a:endParaRPr lang="de-DE"/>
+              <a:endParaRPr lang="de-DE" sz="1013"/>
             </a:p>
           </p:txBody>
         </p:sp>
@@ -3511,7 +3163,7 @@
             <a:lstStyle/>
             <a:p>
               <a:pPr algn="ctr"/>
-              <a:endParaRPr lang="de-DE"/>
+              <a:endParaRPr lang="de-DE" sz="1013"/>
             </a:p>
           </p:txBody>
         </p:sp>
@@ -3568,7 +3220,7 @@
           <p:spPr>
             <a:xfrm>
               <a:off x="0" y="6528873"/>
-              <a:ext cx="2865749" cy="338554"/>
+              <a:ext cx="2865749" cy="369332"/>
             </a:xfrm>
             <a:prstGeom prst="rect">
               <a:avLst/>
@@ -3582,7 +3234,7 @@
             <a:lstStyle/>
             <a:p>
               <a:r>
-                <a:rPr lang="de-DE" sz="1600" b="1">
+                <a:rPr lang="de-DE" sz="1200" b="1" dirty="0">
                   <a:solidFill>
                     <a:schemeClr val="bg1"/>
                   </a:solidFill>
@@ -3591,14 +3243,14 @@
                 <a:t> </a:t>
               </a:r>
               <a:r>
-                <a:rPr lang="de-DE" sz="1400">
+                <a:rPr lang="de-DE" sz="1050" dirty="0">
                   <a:solidFill>
                     <a:schemeClr val="bg1"/>
                   </a:solidFill>
                 </a:rPr>
-                <a:t>Copyright: Der LernCoach 2025</a:t>
+                <a:t>Copyright: Der LernCoach 2026</a:t>
               </a:r>
-              <a:endParaRPr lang="de-DE">
+              <a:endParaRPr lang="de-DE" sz="1013" dirty="0">
                 <a:solidFill>
                   <a:schemeClr val="bg1"/>
                 </a:solidFill>
@@ -3607,6 +3259,71 @@
           </p:txBody>
         </p:sp>
       </p:grpSp>
+      <p:sp>
+        <p:nvSpPr>
+          <p:cNvPr id="2" name="Textfeld 1">
+            <a:extLst>
+              <a:ext uri="{FF2B5EF4-FFF2-40B4-BE49-F238E27FC236}">
+                <a16:creationId xmlns:a16="http://schemas.microsoft.com/office/drawing/2014/main" id="{016F0692-1F7B-45D4-EF92-4D6AD8BBB105}"/>
+              </a:ext>
+            </a:extLst>
+          </p:cNvPr>
+          <p:cNvSpPr txBox="1"/>
+          <p:nvPr/>
+        </p:nvSpPr>
+        <p:spPr>
+          <a:xfrm>
+            <a:off x="437661" y="1310747"/>
+            <a:ext cx="4493846" cy="2585323"/>
+          </a:xfrm>
+          <a:prstGeom prst="rect">
+            <a:avLst/>
+          </a:prstGeom>
+          <a:noFill/>
+        </p:spPr>
+        <p:txBody>
+          <a:bodyPr wrap="square" rtlCol="0">
+            <a:spAutoFit/>
+          </a:bodyPr>
+          <a:lstStyle/>
+          <a:p>
+            <a:r>
+              <a:rPr lang="de-DE" dirty="0"/>
+              <a:t>Achte bei Deiner Vorlage darauf, dass Du im Register </a:t>
+            </a:r>
+            <a:r>
+              <a:rPr lang="de-DE" b="1" dirty="0"/>
+              <a:t>Entwurf</a:t>
+            </a:r>
+            <a:r>
+              <a:rPr lang="de-DE" dirty="0"/>
+              <a:t> / </a:t>
+            </a:r>
+            <a:r>
+              <a:rPr lang="de-DE" b="1" dirty="0"/>
+              <a:t>Foliengröße</a:t>
+            </a:r>
+            <a:r>
+              <a:rPr lang="de-DE" dirty="0"/>
+              <a:t> /  </a:t>
+            </a:r>
+            <a:r>
+              <a:rPr lang="de-DE" b="1" dirty="0"/>
+              <a:t>Benutzerdefinierte Foliengröße </a:t>
+            </a:r>
+            <a:r>
+              <a:rPr lang="de-DE" dirty="0"/>
+              <a:t>im Papierformat erneut das Seitenverhältnis von 16:9 auswählst.</a:t>
+            </a:r>
+          </a:p>
+          <a:p>
+            <a:r>
+              <a:rPr lang="de-DE" dirty="0"/>
+              <a:t>Dann wird die Seitenbreite auf 25,4 cm und die Höhe auf 14,28 cm eingerichtet. Dieses Format passt perfekt in den Canvas-Hintergrund von Power BI.</a:t>
+            </a:r>
+          </a:p>
+        </p:txBody>
+      </p:sp>
     </p:spTree>
     <p:extLst>
       <p:ext uri="{BB962C8B-B14F-4D97-AF65-F5344CB8AC3E}">

</xml_diff>